<commit_message>
(1.5/3) Half-Way Done with Design Overview
Will need pictures eventually
</commit_message>
<xml_diff>
--- a/poster/Poster_v2.pptx
+++ b/poster/Poster_v2.pptx
@@ -305,7 +305,7 @@
             <a:fld id="{35D5C8AE-1ECE-4A4A-8416-EADDD35C2323}" type="datetimeFigureOut">
               <a:rPr lang="en-US" smtClean="0"/>
               <a:pPr/>
-              <a:t>4/18/2014</a:t>
+              <a:t>4/19/2014</a:t>
             </a:fld>
             <a:endParaRPr lang="en-US"/>
           </a:p>
@@ -477,7 +477,7 @@
             <a:fld id="{35D5C8AE-1ECE-4A4A-8416-EADDD35C2323}" type="datetimeFigureOut">
               <a:rPr lang="en-US" smtClean="0"/>
               <a:pPr/>
-              <a:t>4/18/2014</a:t>
+              <a:t>4/19/2014</a:t>
             </a:fld>
             <a:endParaRPr lang="en-US"/>
           </a:p>
@@ -659,7 +659,7 @@
             <a:fld id="{35D5C8AE-1ECE-4A4A-8416-EADDD35C2323}" type="datetimeFigureOut">
               <a:rPr lang="en-US" smtClean="0"/>
               <a:pPr/>
-              <a:t>4/18/2014</a:t>
+              <a:t>4/19/2014</a:t>
             </a:fld>
             <a:endParaRPr lang="en-US"/>
           </a:p>
@@ -831,7 +831,7 @@
             <a:fld id="{35D5C8AE-1ECE-4A4A-8416-EADDD35C2323}" type="datetimeFigureOut">
               <a:rPr lang="en-US" smtClean="0"/>
               <a:pPr/>
-              <a:t>4/18/2014</a:t>
+              <a:t>4/19/2014</a:t>
             </a:fld>
             <a:endParaRPr lang="en-US"/>
           </a:p>
@@ -1079,7 +1079,7 @@
             <a:fld id="{35D5C8AE-1ECE-4A4A-8416-EADDD35C2323}" type="datetimeFigureOut">
               <a:rPr lang="en-US" smtClean="0"/>
               <a:pPr/>
-              <a:t>4/18/2014</a:t>
+              <a:t>4/19/2014</a:t>
             </a:fld>
             <a:endParaRPr lang="en-US"/>
           </a:p>
@@ -1369,7 +1369,7 @@
             <a:fld id="{35D5C8AE-1ECE-4A4A-8416-EADDD35C2323}" type="datetimeFigureOut">
               <a:rPr lang="en-US" smtClean="0"/>
               <a:pPr/>
-              <a:t>4/18/2014</a:t>
+              <a:t>4/19/2014</a:t>
             </a:fld>
             <a:endParaRPr lang="en-US"/>
           </a:p>
@@ -1793,7 +1793,7 @@
             <a:fld id="{35D5C8AE-1ECE-4A4A-8416-EADDD35C2323}" type="datetimeFigureOut">
               <a:rPr lang="en-US" smtClean="0"/>
               <a:pPr/>
-              <a:t>4/18/2014</a:t>
+              <a:t>4/19/2014</a:t>
             </a:fld>
             <a:endParaRPr lang="en-US"/>
           </a:p>
@@ -1913,7 +1913,7 @@
             <a:fld id="{35D5C8AE-1ECE-4A4A-8416-EADDD35C2323}" type="datetimeFigureOut">
               <a:rPr lang="en-US" smtClean="0"/>
               <a:pPr/>
-              <a:t>4/18/2014</a:t>
+              <a:t>4/19/2014</a:t>
             </a:fld>
             <a:endParaRPr lang="en-US"/>
           </a:p>
@@ -2010,7 +2010,7 @@
             <a:fld id="{35D5C8AE-1ECE-4A4A-8416-EADDD35C2323}" type="datetimeFigureOut">
               <a:rPr lang="en-US" smtClean="0"/>
               <a:pPr/>
-              <a:t>4/18/2014</a:t>
+              <a:t>4/19/2014</a:t>
             </a:fld>
             <a:endParaRPr lang="en-US"/>
           </a:p>
@@ -2289,7 +2289,7 @@
             <a:fld id="{35D5C8AE-1ECE-4A4A-8416-EADDD35C2323}" type="datetimeFigureOut">
               <a:rPr lang="en-US" smtClean="0"/>
               <a:pPr/>
-              <a:t>4/18/2014</a:t>
+              <a:t>4/19/2014</a:t>
             </a:fld>
             <a:endParaRPr lang="en-US"/>
           </a:p>
@@ -2544,7 +2544,7 @@
             <a:fld id="{35D5C8AE-1ECE-4A4A-8416-EADDD35C2323}" type="datetimeFigureOut">
               <a:rPr lang="en-US" smtClean="0"/>
               <a:pPr/>
-              <a:t>4/18/2014</a:t>
+              <a:t>4/19/2014</a:t>
             </a:fld>
             <a:endParaRPr lang="en-US"/>
           </a:p>
@@ -2759,7 +2759,7 @@
             <a:fld id="{35D5C8AE-1ECE-4A4A-8416-EADDD35C2323}" type="datetimeFigureOut">
               <a:rPr lang="en-US" smtClean="0"/>
               <a:pPr/>
-              <a:t>4/18/2014</a:t>
+              <a:t>4/19/2014</a:t>
             </a:fld>
             <a:endParaRPr lang="en-US"/>
           </a:p>
@@ -4199,7 +4199,7 @@
         <p:spPr>
           <a:xfrm>
             <a:off x="15730658" y="7162800"/>
-            <a:ext cx="12281319" cy="3416320"/>
+            <a:ext cx="12281319" cy="3970318"/>
           </a:xfrm>
           <a:prstGeom prst="rect">
             <a:avLst/>
@@ -4213,50 +4213,46 @@
           <a:lstStyle/>
           <a:p>
             <a:r>
-              <a:rPr lang="en-US" sz="3600" b="1" dirty="0" smtClean="0"/>
-              <a:t>Computer Engineering Design:</a:t>
-            </a:r>
-          </a:p>
-          <a:p>
-            <a:r>
               <a:rPr lang="en-US" sz="3600" dirty="0" smtClean="0"/>
-              <a:t>The bike station electronics were  designed to provide ease of use for the users .  The electronics allow for the stations to be placed in a variety of locations across campus. The stations are capable of talking to the server to keep track of checkout information and verify bike locks. </a:t>
-            </a:r>
+              <a:t>(Students) The “Robotic</a:t>
+            </a:r>
+            <a:r>
+              <a:rPr lang="en-US" sz="3600" dirty="0"/>
+              <a:t>" </a:t>
+            </a:r>
+            <a:r>
+              <a:rPr lang="en-US" sz="3600" dirty="0" smtClean="0"/>
+              <a:t>Doorman </a:t>
+            </a:r>
+            <a:r>
+              <a:rPr lang="en-US" sz="3600" dirty="0"/>
+              <a:t>project was designed with the needs of </a:t>
+            </a:r>
+            <a:r>
+              <a:rPr lang="en-US" sz="3600" dirty="0" smtClean="0"/>
+              <a:t>each of the project’s shareholders </a:t>
+            </a:r>
+            <a:r>
+              <a:rPr lang="en-US" sz="3600" dirty="0"/>
+              <a:t>in mind.</a:t>
+            </a:r>
+          </a:p>
+          <a:p>
+            <a:endParaRPr lang="en-US" sz="3600" dirty="0" smtClean="0"/>
+          </a:p>
+          <a:p>
+            <a:r>
+              <a:rPr lang="en-US" sz="3600" dirty="0" smtClean="0"/>
+              <a:t>To address the needs of students, (mention door lock mechanism here), </a:t>
+            </a:r>
+          </a:p>
+          <a:p>
             <a:endParaRPr lang="en-US" sz="3600" dirty="0"/>
           </a:p>
-        </p:txBody>
-      </p:sp>
-      <p:sp>
-        <p:nvSpPr>
-          <p:cNvPr id="1037" name="TextBox 1036"/>
-          <p:cNvSpPr txBox="1"/>
-          <p:nvPr/>
-        </p:nvSpPr>
-        <p:spPr>
-          <a:xfrm>
-            <a:off x="15239999" y="17975282"/>
-            <a:ext cx="13411201" cy="3970318"/>
-          </a:xfrm>
-          <a:prstGeom prst="rect">
-            <a:avLst/>
-          </a:prstGeom>
-          <a:noFill/>
-        </p:spPr>
-        <p:txBody>
-          <a:bodyPr wrap="square" rtlCol="0">
-            <a:spAutoFit/>
-          </a:bodyPr>
-          <a:lstStyle/>
-          <a:p>
-            <a:r>
-              <a:rPr lang="en-US" sz="3600" b="1" dirty="0" smtClean="0"/>
-              <a:t>Mechanical Engineering Design:</a:t>
-            </a:r>
-          </a:p>
           <a:p>
             <a:r>
               <a:rPr lang="en-US" sz="3600" dirty="0" smtClean="0"/>
-              <a:t>Mechanical design focused on ensuring that once the bike was locked, no one would be able to remove it. Simplicity was kept in mind to reduce the amount of parts needed; which also reduces the number of failure points. All parts were drawn and assembled using AutoCAD to ensure proper sizing. Strength calculations were performed to ensure the system met all the design needs.  </a:t>
+              <a:t>a mechanism to rotate the doorknob on the inside </a:t>
             </a:r>
             <a:endParaRPr lang="en-US" sz="3600" dirty="0"/>
           </a:p>
@@ -4413,7 +4409,7 @@
           <a:noFill/>
           <a:extLst>
             <a:ext uri="{909E8E84-426E-40dd-AFC4-6F175D3DCCD1}">
-              <a14:hiddenFill xmlns:a14="http://schemas.microsoft.com/office/drawing/2010/main" xmlns="">
+              <a14:hiddenFill xmlns="" xmlns:a14="http://schemas.microsoft.com/office/drawing/2010/main">
                 <a:solidFill>
                   <a:srgbClr val="FFFFFF"/>
                 </a:solidFill>
@@ -4454,7 +4450,7 @@
           <a:noFill/>
           <a:extLst>
             <a:ext uri="{909E8E84-426E-40dd-AFC4-6F175D3DCCD1}">
-              <a14:hiddenFill xmlns:a14="http://schemas.microsoft.com/office/drawing/2010/main" xmlns="">
+              <a14:hiddenFill xmlns="" xmlns:a14="http://schemas.microsoft.com/office/drawing/2010/main">
                 <a:solidFill>
                   <a:srgbClr val="FFFFFF"/>
                 </a:solidFill>
@@ -4487,15 +4483,7 @@
           <a:p>
             <a:r>
               <a:rPr lang="en-US" sz="3600" dirty="0" smtClean="0"/>
-              <a:t>S</a:t>
-            </a:r>
-            <a:r>
-              <a:rPr lang="en-US" sz="3600" dirty="0" smtClean="0"/>
-              <a:t>pecial </a:t>
-            </a:r>
-            <a:r>
-              <a:rPr lang="en-US" sz="3600" dirty="0" smtClean="0"/>
-              <a:t>thanks to:</a:t>
+              <a:t>Special thanks to:</a:t>
             </a:r>
           </a:p>
           <a:p>
@@ -4507,7 +4495,6 @@
               <a:rPr lang="en-US" sz="3600" dirty="0" smtClean="0"/>
               <a:t>Victor Lee (colleague) for printing our group’s poster.</a:t>
             </a:r>
-            <a:endParaRPr lang="en-US" sz="3600" dirty="0" smtClean="0"/>
           </a:p>
           <a:p>
             <a:pPr marL="571500" indent="-571500">
@@ -4516,13 +4503,8 @@
             </a:pPr>
             <a:r>
               <a:rPr lang="en-US" sz="3600" dirty="0" smtClean="0"/>
-              <a:t>Thanks to Terry Walsh for </a:t>
-            </a:r>
-            <a:r>
-              <a:rPr lang="en-US" sz="3600" dirty="0" smtClean="0"/>
-              <a:t>assisting with project demonstration.</a:t>
-            </a:r>
-            <a:endParaRPr lang="en-US" sz="3600" dirty="0" smtClean="0"/>
+              <a:t>Thanks to Terry Walsh for assisting with project demonstration.</a:t>
+            </a:r>
           </a:p>
           <a:p>
             <a:pPr marL="571500" indent="-571500">
@@ -4531,11 +4513,7 @@
             </a:pPr>
             <a:r>
               <a:rPr lang="en-US" sz="3600" dirty="0" smtClean="0"/>
-              <a:t>Dr. Johnsen and Dr. Kner for their invaluable </a:t>
-            </a:r>
-            <a:r>
-              <a:rPr lang="en-US" sz="3600" dirty="0" smtClean="0"/>
-              <a:t>help and guidance.</a:t>
+              <a:t>Dr. Johnsen and Dr. Kner for their invaluable help and guidance.</a:t>
             </a:r>
             <a:endParaRPr lang="en-US" sz="3600" dirty="0"/>
           </a:p>
@@ -4563,7 +4541,7 @@
           <a:graphicData uri="http://schemas.openxmlformats.org/presentationml/2006/ole">
             <mc:AlternateContent xmlns:mc="http://schemas.openxmlformats.org/markup-compatibility/2006">
               <mc:Choice xmlns:v="urn:schemas-microsoft-com:vml" Requires="v">
-                <p:oleObj spid="_x0000_s1085" name="Binary Worksheet" r:id="rId6" imgW="9029633" imgH="10915656" progId="Excel.SheetBinaryMacroEnabled.12">
+                <p:oleObj spid="_x0000_s1089" name="Binary Worksheet" r:id="rId6" imgW="9029633" imgH="10915656" progId="Excel.SheetBinaryMacroEnabled.12">
                   <p:embed/>
                 </p:oleObj>
               </mc:Choice>
@@ -4657,153 +4635,6 @@
           </a:p>
         </p:txBody>
       </p:sp>
-      <p:pic>
-        <p:nvPicPr>
-          <p:cNvPr id="41" name="Picture 40" descr="bike_dock.jpg"/>
-          <p:cNvPicPr>
-            <a:picLocks noChangeAspect="1"/>
-          </p:cNvPicPr>
-          <p:nvPr/>
-        </p:nvPicPr>
-        <p:blipFill>
-          <a:blip r:embed="rId8" cstate="print"/>
-          <a:srcRect l="6275"/>
-          <a:stretch>
-            <a:fillRect/>
-          </a:stretch>
-        </p:blipFill>
-        <p:spPr>
-          <a:xfrm>
-            <a:off x="15240000" y="26060400"/>
-            <a:ext cx="7967304" cy="5638800"/>
-          </a:xfrm>
-          <a:prstGeom prst="rect">
-            <a:avLst/>
-          </a:prstGeom>
-        </p:spPr>
-      </p:pic>
-      <p:pic>
-        <p:nvPicPr>
-          <p:cNvPr id="42" name="Picture 41" descr="dock_top.jpg"/>
-          <p:cNvPicPr>
-            <a:picLocks noChangeAspect="1"/>
-          </p:cNvPicPr>
-          <p:nvPr/>
-        </p:nvPicPr>
-        <p:blipFill>
-          <a:blip r:embed="rId9" cstate="print"/>
-          <a:srcRect b="26791"/>
-          <a:stretch>
-            <a:fillRect/>
-          </a:stretch>
-        </p:blipFill>
-        <p:spPr>
-          <a:xfrm>
-            <a:off x="20421600" y="22098000"/>
-            <a:ext cx="8305800" cy="4038600"/>
-          </a:xfrm>
-          <a:prstGeom prst="rect">
-            <a:avLst/>
-          </a:prstGeom>
-        </p:spPr>
-      </p:pic>
-      <p:pic>
-        <p:nvPicPr>
-          <p:cNvPr id="43" name="Picture 42" descr="bike_dock_pcb_v1.png"/>
-          <p:cNvPicPr>
-            <a:picLocks noChangeAspect="1"/>
-          </p:cNvPicPr>
-          <p:nvPr/>
-        </p:nvPicPr>
-        <p:blipFill>
-          <a:blip r:embed="rId10" cstate="print"/>
-          <a:stretch>
-            <a:fillRect/>
-          </a:stretch>
-        </p:blipFill>
-        <p:spPr>
-          <a:xfrm>
-            <a:off x="21183600" y="10439400"/>
-            <a:ext cx="6645799" cy="4953000"/>
-          </a:xfrm>
-          <a:prstGeom prst="rect">
-            <a:avLst/>
-          </a:prstGeom>
-        </p:spPr>
-      </p:pic>
-      <p:pic>
-        <p:nvPicPr>
-          <p:cNvPr id="51" name="Picture 50" descr="All_PCBs.JPG"/>
-          <p:cNvPicPr>
-            <a:picLocks noChangeAspect="1"/>
-          </p:cNvPicPr>
-          <p:nvPr/>
-        </p:nvPicPr>
-        <p:blipFill>
-          <a:blip r:embed="rId11" cstate="print"/>
-          <a:stretch>
-            <a:fillRect/>
-          </a:stretch>
-        </p:blipFill>
-        <p:spPr>
-          <a:xfrm>
-            <a:off x="23926800" y="15011400"/>
-            <a:ext cx="4495800" cy="2600322"/>
-          </a:xfrm>
-          <a:prstGeom prst="rect">
-            <a:avLst/>
-          </a:prstGeom>
-        </p:spPr>
-      </p:pic>
-      <p:pic>
-        <p:nvPicPr>
-          <p:cNvPr id="64" name="Picture 63" descr="dock_pcb_top.jpg"/>
-          <p:cNvPicPr>
-            <a:picLocks noChangeAspect="1"/>
-          </p:cNvPicPr>
-          <p:nvPr/>
-        </p:nvPicPr>
-        <p:blipFill>
-          <a:blip r:embed="rId12" cstate="print"/>
-          <a:stretch>
-            <a:fillRect/>
-          </a:stretch>
-        </p:blipFill>
-        <p:spPr>
-          <a:xfrm>
-            <a:off x="15849600" y="12420600"/>
-            <a:ext cx="5410200" cy="5148416"/>
-          </a:xfrm>
-          <a:prstGeom prst="rect">
-            <a:avLst/>
-          </a:prstGeom>
-        </p:spPr>
-      </p:pic>
-      <p:pic>
-        <p:nvPicPr>
-          <p:cNvPr id="65" name="Picture 64" descr="dock_3.jpg"/>
-          <p:cNvPicPr>
-            <a:picLocks noChangeAspect="1"/>
-          </p:cNvPicPr>
-          <p:nvPr/>
-        </p:nvPicPr>
-        <p:blipFill>
-          <a:blip r:embed="rId13" cstate="print"/>
-          <a:srcRect l="2044" t="7692" r="14168"/>
-          <a:stretch>
-            <a:fillRect/>
-          </a:stretch>
-        </p:blipFill>
-        <p:spPr>
-          <a:xfrm>
-            <a:off x="22250400" y="26746200"/>
-            <a:ext cx="6664960" cy="4876800"/>
-          </a:xfrm>
-          <a:prstGeom prst="rect">
-            <a:avLst/>
-          </a:prstGeom>
-        </p:spPr>
-      </p:pic>
       <p:sp>
         <p:nvSpPr>
           <p:cNvPr id="50" name="TextBox 49"/>
@@ -4829,42 +4660,12 @@
             <a:pPr algn="ctr"/>
             <a:r>
               <a:rPr lang="en-US" sz="3200" dirty="0" smtClean="0"/>
-              <a:t>From left to right: </a:t>
-            </a:r>
-            <a:r>
-              <a:rPr lang="en-US" sz="3200" dirty="0" smtClean="0"/>
-              <a:t>Adam Hall, Jasper Yu, Peter Wins, Dr. Johnsen</a:t>
+              <a:t>From left to right: Adam Hall, Jasper Yu, Peter Wins, Dr. Johnsen</a:t>
             </a:r>
             <a:endParaRPr lang="en-US" sz="3200" dirty="0"/>
           </a:p>
         </p:txBody>
       </p:sp>
-      <p:pic>
-        <p:nvPicPr>
-          <p:cNvPr id="1074" name="Picture 50" descr="http://vel.engr.uga.edu/csee/lib/exe/fetch.php/csee4920/2013/lock_1.jpg?cache="/>
-          <p:cNvPicPr>
-            <a:picLocks noChangeAspect="1" noChangeArrowheads="1"/>
-          </p:cNvPicPr>
-          <p:nvPr/>
-        </p:nvPicPr>
-        <p:blipFill>
-          <a:blip r:embed="rId14" cstate="print"/>
-          <a:srcRect l="12960"/>
-          <a:stretch>
-            <a:fillRect/>
-          </a:stretch>
-        </p:blipFill>
-        <p:spPr bwMode="auto">
-          <a:xfrm>
-            <a:off x="15316200" y="22098000"/>
-            <a:ext cx="5592150" cy="4267200"/>
-          </a:xfrm>
-          <a:prstGeom prst="rect">
-            <a:avLst/>
-          </a:prstGeom>
-          <a:noFill/>
-        </p:spPr>
-      </p:pic>
       <p:sp>
         <p:nvSpPr>
           <p:cNvPr id="66" name="TextBox 65"/>
@@ -4890,6 +4691,217 @@
             <a:r>
               <a:rPr lang="en-US" sz="3600" b="1" dirty="0" smtClean="0"/>
               <a:t>Team Picture Here!</a:t>
+            </a:r>
+            <a:endParaRPr lang="en-US" sz="3600" dirty="0"/>
+          </a:p>
+        </p:txBody>
+      </p:sp>
+      <p:sp>
+        <p:nvSpPr>
+          <p:cNvPr id="44" name="TextBox 43"/>
+          <p:cNvSpPr txBox="1"/>
+          <p:nvPr/>
+        </p:nvSpPr>
+        <p:spPr>
+          <a:xfrm>
+            <a:off x="19585767" y="11621147"/>
+            <a:ext cx="4450957" cy="646331"/>
+          </a:xfrm>
+          <a:prstGeom prst="rect">
+            <a:avLst/>
+          </a:prstGeom>
+          <a:noFill/>
+        </p:spPr>
+        <p:txBody>
+          <a:bodyPr wrap="square" rtlCol="0">
+            <a:spAutoFit/>
+          </a:bodyPr>
+          <a:lstStyle/>
+          <a:p>
+            <a:r>
+              <a:rPr lang="en-US" sz="3600" b="1" dirty="0" smtClean="0"/>
+              <a:t>Some Pictures </a:t>
+            </a:r>
+            <a:r>
+              <a:rPr lang="en-US" sz="3600" b="1" dirty="0" err="1" smtClean="0"/>
+              <a:t>Heres</a:t>
+            </a:r>
+            <a:r>
+              <a:rPr lang="en-US" sz="3600" b="1" dirty="0" smtClean="0"/>
+              <a:t>!</a:t>
+            </a:r>
+            <a:endParaRPr lang="en-US" sz="3600" dirty="0"/>
+          </a:p>
+        </p:txBody>
+      </p:sp>
+      <p:sp>
+        <p:nvSpPr>
+          <p:cNvPr id="67" name="TextBox 66"/>
+          <p:cNvSpPr txBox="1"/>
+          <p:nvPr/>
+        </p:nvSpPr>
+        <p:spPr>
+          <a:xfrm>
+            <a:off x="15851562" y="22298085"/>
+            <a:ext cx="12281319" cy="4524315"/>
+          </a:xfrm>
+          <a:prstGeom prst="rect">
+            <a:avLst/>
+          </a:prstGeom>
+          <a:noFill/>
+        </p:spPr>
+        <p:txBody>
+          <a:bodyPr wrap="square" rtlCol="0">
+            <a:spAutoFit/>
+          </a:bodyPr>
+          <a:lstStyle/>
+          <a:p>
+            <a:r>
+              <a:rPr lang="en-US" sz="3600" dirty="0"/>
+              <a:t>To address the needs of the University System, an RFID access system was implemented. This approach solves one of the greatest problems of the traditional door key access system: students losing keys. When a student loses a key, the University has a decision to make: keep the compromised lock and replace the key, or replace both the lock and the key. Neither choice is ideal. By implementing a system with easily-replaceable keys, both of these traditional problems are solved.</a:t>
+            </a:r>
+          </a:p>
+        </p:txBody>
+      </p:sp>
+      <p:sp>
+        <p:nvSpPr>
+          <p:cNvPr id="68" name="TextBox 67"/>
+          <p:cNvSpPr txBox="1"/>
+          <p:nvPr/>
+        </p:nvSpPr>
+        <p:spPr>
+          <a:xfrm>
+            <a:off x="19585768" y="29032200"/>
+            <a:ext cx="4450957" cy="646331"/>
+          </a:xfrm>
+          <a:prstGeom prst="rect">
+            <a:avLst/>
+          </a:prstGeom>
+          <a:noFill/>
+        </p:spPr>
+        <p:txBody>
+          <a:bodyPr wrap="square" rtlCol="0">
+            <a:spAutoFit/>
+          </a:bodyPr>
+          <a:lstStyle/>
+          <a:p>
+            <a:r>
+              <a:rPr lang="en-US" sz="3600" b="1" dirty="0" smtClean="0"/>
+              <a:t>Some Pictures </a:t>
+            </a:r>
+            <a:r>
+              <a:rPr lang="en-US" sz="3600" b="1" dirty="0" err="1" smtClean="0"/>
+              <a:t>Heres</a:t>
+            </a:r>
+            <a:r>
+              <a:rPr lang="en-US" sz="3600" b="1" dirty="0" smtClean="0"/>
+              <a:t>!</a:t>
+            </a:r>
+            <a:endParaRPr lang="en-US" sz="3600" dirty="0"/>
+          </a:p>
+        </p:txBody>
+      </p:sp>
+      <p:sp>
+        <p:nvSpPr>
+          <p:cNvPr id="69" name="TextBox 68"/>
+          <p:cNvSpPr txBox="1"/>
+          <p:nvPr/>
+        </p:nvSpPr>
+        <p:spPr>
+          <a:xfrm>
+            <a:off x="15997297" y="15237708"/>
+            <a:ext cx="12281319" cy="3970318"/>
+          </a:xfrm>
+          <a:prstGeom prst="rect">
+            <a:avLst/>
+          </a:prstGeom>
+          <a:noFill/>
+        </p:spPr>
+        <p:txBody>
+          <a:bodyPr wrap="square" rtlCol="0">
+            <a:spAutoFit/>
+          </a:bodyPr>
+          <a:lstStyle/>
+          <a:p>
+            <a:r>
+              <a:rPr lang="en-US" sz="3600" dirty="0" smtClean="0"/>
+              <a:t>(Faculty) The “Robotic</a:t>
+            </a:r>
+            <a:r>
+              <a:rPr lang="en-US" sz="3600" dirty="0"/>
+              <a:t>" </a:t>
+            </a:r>
+            <a:r>
+              <a:rPr lang="en-US" sz="3600" dirty="0" smtClean="0"/>
+              <a:t>Doorman </a:t>
+            </a:r>
+            <a:r>
+              <a:rPr lang="en-US" sz="3600" dirty="0"/>
+              <a:t>project was designed with the needs of </a:t>
+            </a:r>
+            <a:r>
+              <a:rPr lang="en-US" sz="3600" dirty="0" smtClean="0"/>
+              <a:t>each of the project’s shareholders </a:t>
+            </a:r>
+            <a:r>
+              <a:rPr lang="en-US" sz="3600" dirty="0"/>
+              <a:t>in mind.</a:t>
+            </a:r>
+          </a:p>
+          <a:p>
+            <a:endParaRPr lang="en-US" sz="3600" dirty="0" smtClean="0"/>
+          </a:p>
+          <a:p>
+            <a:r>
+              <a:rPr lang="en-US" sz="3600" dirty="0" smtClean="0"/>
+              <a:t>To address the needs of students, (mention door lock mechanism here), </a:t>
+            </a:r>
+          </a:p>
+          <a:p>
+            <a:endParaRPr lang="en-US" sz="3600" dirty="0"/>
+          </a:p>
+          <a:p>
+            <a:r>
+              <a:rPr lang="en-US" sz="3600" dirty="0" smtClean="0"/>
+              <a:t>a mechanism to rotate the doorknob on the inside </a:t>
+            </a:r>
+            <a:endParaRPr lang="en-US" sz="3600" dirty="0"/>
+          </a:p>
+        </p:txBody>
+      </p:sp>
+      <p:sp>
+        <p:nvSpPr>
+          <p:cNvPr id="70" name="TextBox 69"/>
+          <p:cNvSpPr txBox="1"/>
+          <p:nvPr/>
+        </p:nvSpPr>
+        <p:spPr>
+          <a:xfrm>
+            <a:off x="19585767" y="20383322"/>
+            <a:ext cx="4450957" cy="646331"/>
+          </a:xfrm>
+          <a:prstGeom prst="rect">
+            <a:avLst/>
+          </a:prstGeom>
+          <a:noFill/>
+        </p:spPr>
+        <p:txBody>
+          <a:bodyPr wrap="square" rtlCol="0">
+            <a:spAutoFit/>
+          </a:bodyPr>
+          <a:lstStyle/>
+          <a:p>
+            <a:r>
+              <a:rPr lang="en-US" sz="3600" b="1" dirty="0" smtClean="0"/>
+              <a:t>Some Pictures </a:t>
+            </a:r>
+            <a:r>
+              <a:rPr lang="en-US" sz="3600" b="1" dirty="0" err="1" smtClean="0"/>
+              <a:t>Heres</a:t>
+            </a:r>
+            <a:r>
+              <a:rPr lang="en-US" sz="3600" b="1" dirty="0" smtClean="0"/>
+              <a:t>!</a:t>
             </a:r>
             <a:endParaRPr lang="en-US" sz="3600" dirty="0"/>
           </a:p>

</xml_diff>

<commit_message>
(2/3) Design Overview Done
Might have too much text. Might remove a few lines to add more space for
pictures.
</commit_message>
<xml_diff>
--- a/poster/Poster_v2.pptx
+++ b/poster/Poster_v2.pptx
@@ -3458,8 +3458,12 @@
               <a:buChar char="•"/>
             </a:pPr>
             <a:r>
+              <a:rPr lang="en-US" sz="3600" dirty="0"/>
+              <a:t>T</a:t>
+            </a:r>
+            <a:r>
               <a:rPr lang="en-US" sz="3600" dirty="0" smtClean="0"/>
-              <a:t>the </a:t>
+              <a:t>he </a:t>
             </a:r>
             <a:r>
               <a:rPr lang="en-US" sz="3600" dirty="0"/>
@@ -3644,7 +3648,7 @@
         </p:nvSpPr>
         <p:spPr>
           <a:xfrm>
-            <a:off x="14996611" y="4679109"/>
+            <a:off x="14996611" y="4648200"/>
             <a:ext cx="13991222" cy="27381851"/>
           </a:xfrm>
           <a:prstGeom prst="rect">
@@ -4198,8 +4202,8 @@
         </p:nvSpPr>
         <p:spPr>
           <a:xfrm>
-            <a:off x="15730658" y="7162800"/>
-            <a:ext cx="12281319" cy="3970318"/>
+            <a:off x="15009957" y="7065551"/>
+            <a:ext cx="13977876" cy="3416320"/>
           </a:xfrm>
           <a:prstGeom prst="rect">
             <a:avLst/>
@@ -4207,54 +4211,35 @@
           <a:noFill/>
         </p:spPr>
         <p:txBody>
-          <a:bodyPr wrap="square" rtlCol="0">
+          <a:bodyPr wrap="square" lIns="731520" rIns="731520" rtlCol="0">
             <a:spAutoFit/>
           </a:bodyPr>
           <a:lstStyle/>
           <a:p>
             <a:r>
               <a:rPr lang="en-US" sz="3600" dirty="0" smtClean="0"/>
-              <a:t>(Students) The “Robotic</a:t>
-            </a:r>
-            <a:r>
-              <a:rPr lang="en-US" sz="3600" dirty="0"/>
-              <a:t>" </a:t>
+              <a:t>To </a:t>
             </a:r>
             <a:r>
               <a:rPr lang="en-US" sz="3600" dirty="0" smtClean="0"/>
-              <a:t>Doorman </a:t>
-            </a:r>
-            <a:r>
-              <a:rPr lang="en-US" sz="3600" dirty="0"/>
-              <a:t>project was designed with the needs of </a:t>
+              <a:t>address the needs of students, </a:t>
             </a:r>
             <a:r>
               <a:rPr lang="en-US" sz="3600" dirty="0" smtClean="0"/>
-              <a:t>each of the project’s shareholders </a:t>
-            </a:r>
-            <a:r>
-              <a:rPr lang="en-US" sz="3600" dirty="0"/>
-              <a:t>in mind.</a:t>
-            </a:r>
-          </a:p>
-          <a:p>
-            <a:endParaRPr lang="en-US" sz="3600" dirty="0" smtClean="0"/>
-          </a:p>
-          <a:p>
+              <a:t>several doors in the </a:t>
+            </a:r>
+            <a:r>
+              <a:rPr lang="en-US" sz="3600" dirty="0" err="1" smtClean="0"/>
+              <a:t>Driftmier</a:t>
+            </a:r>
             <a:r>
               <a:rPr lang="en-US" sz="3600" dirty="0" smtClean="0"/>
-              <a:t>To address the needs of students, (mention door lock mechanism here), </a:t>
-            </a:r>
-          </a:p>
-          <a:p>
-            <a:endParaRPr lang="en-US" sz="3600" dirty="0"/>
-          </a:p>
-          <a:p>
+              <a:t> Engineering Center were closely studied. </a:t>
+            </a:r>
             <a:r>
               <a:rPr lang="en-US" sz="3600" dirty="0" smtClean="0"/>
-              <a:t>a mechanism to rotate the doorknob on the inside </a:t>
-            </a:r>
-            <a:endParaRPr lang="en-US" sz="3600" dirty="0"/>
+              <a:t>The locking mechanism on a majority of classrooms could remain locked but be opened by rotating the doorknob inside the room. Based on this type of locking mechanism, a system to rotate the inside doorknob using a motor controller, stepper motor, and rotary encoder was devised.</a:t>
+            </a:r>
           </a:p>
         </p:txBody>
       </p:sp>
@@ -4409,7 +4394,7 @@
           <a:noFill/>
           <a:extLst>
             <a:ext uri="{909E8E84-426E-40dd-AFC4-6F175D3DCCD1}">
-              <a14:hiddenFill xmlns="" xmlns:a14="http://schemas.microsoft.com/office/drawing/2010/main">
+              <a14:hiddenFill xmlns:a14="http://schemas.microsoft.com/office/drawing/2010/main" xmlns="">
                 <a:solidFill>
                   <a:srgbClr val="FFFFFF"/>
                 </a:solidFill>
@@ -4450,7 +4435,7 @@
           <a:noFill/>
           <a:extLst>
             <a:ext uri="{909E8E84-426E-40dd-AFC4-6F175D3DCCD1}">
-              <a14:hiddenFill xmlns="" xmlns:a14="http://schemas.microsoft.com/office/drawing/2010/main">
+              <a14:hiddenFill xmlns:a14="http://schemas.microsoft.com/office/drawing/2010/main" xmlns="">
                 <a:solidFill>
                   <a:srgbClr val="FFFFFF"/>
                 </a:solidFill>
@@ -4541,7 +4526,7 @@
           <a:graphicData uri="http://schemas.openxmlformats.org/presentationml/2006/ole">
             <mc:AlternateContent xmlns:mc="http://schemas.openxmlformats.org/markup-compatibility/2006">
               <mc:Choice xmlns:v="urn:schemas-microsoft-com:vml" Requires="v">
-                <p:oleObj spid="_x0000_s1089" name="Binary Worksheet" r:id="rId6" imgW="9029633" imgH="10915656" progId="Excel.SheetBinaryMacroEnabled.12">
+                <p:oleObj spid="_x0000_s1099" name="Binary Worksheet" r:id="rId6" imgW="9029633" imgH="10915656" progId="Excel.SheetBinaryMacroEnabled.12">
                   <p:embed/>
                 </p:oleObj>
               </mc:Choice>
@@ -4704,7 +4689,7 @@
         </p:nvSpPr>
         <p:spPr>
           <a:xfrm>
-            <a:off x="19585767" y="11621147"/>
+            <a:off x="19682021" y="12192000"/>
             <a:ext cx="4450957" cy="646331"/>
           </a:xfrm>
           <a:prstGeom prst="rect">
@@ -4723,43 +4708,10 @@
               <a:t>Some Pictures </a:t>
             </a:r>
             <a:r>
-              <a:rPr lang="en-US" sz="3600" b="1" dirty="0" err="1" smtClean="0"/>
-              <a:t>Heres</a:t>
-            </a:r>
-            <a:r>
               <a:rPr lang="en-US" sz="3600" b="1" dirty="0" smtClean="0"/>
-              <a:t>!</a:t>
+              <a:t>Here!</a:t>
             </a:r>
             <a:endParaRPr lang="en-US" sz="3600" dirty="0"/>
-          </a:p>
-        </p:txBody>
-      </p:sp>
-      <p:sp>
-        <p:nvSpPr>
-          <p:cNvPr id="67" name="TextBox 66"/>
-          <p:cNvSpPr txBox="1"/>
-          <p:nvPr/>
-        </p:nvSpPr>
-        <p:spPr>
-          <a:xfrm>
-            <a:off x="15851562" y="22298085"/>
-            <a:ext cx="12281319" cy="4524315"/>
-          </a:xfrm>
-          <a:prstGeom prst="rect">
-            <a:avLst/>
-          </a:prstGeom>
-          <a:noFill/>
-        </p:spPr>
-        <p:txBody>
-          <a:bodyPr wrap="square" rtlCol="0">
-            <a:spAutoFit/>
-          </a:bodyPr>
-          <a:lstStyle/>
-          <a:p>
-            <a:r>
-              <a:rPr lang="en-US" sz="3600" dirty="0"/>
-              <a:t>To address the needs of the University System, an RFID access system was implemented. This approach solves one of the greatest problems of the traditional door key access system: students losing keys. When a student loses a key, the University has a decision to make: keep the compromised lock and replace the key, or replace both the lock and the key. Neither choice is ideal. By implementing a system with easily-replaceable keys, both of these traditional problems are solved.</a:t>
-            </a:r>
           </a:p>
         </p:txBody>
       </p:sp>
@@ -4771,7 +4723,7 @@
         </p:nvSpPr>
         <p:spPr>
           <a:xfrm>
-            <a:off x="19585768" y="29032200"/>
+            <a:off x="19682021" y="29452669"/>
             <a:ext cx="4450957" cy="646331"/>
           </a:xfrm>
           <a:prstGeom prst="rect">
@@ -4790,80 +4742,8 @@
               <a:t>Some Pictures </a:t>
             </a:r>
             <a:r>
-              <a:rPr lang="en-US" sz="3600" b="1" dirty="0" err="1" smtClean="0"/>
-              <a:t>Heres</a:t>
-            </a:r>
-            <a:r>
               <a:rPr lang="en-US" sz="3600" b="1" dirty="0" smtClean="0"/>
-              <a:t>!</a:t>
-            </a:r>
-            <a:endParaRPr lang="en-US" sz="3600" dirty="0"/>
-          </a:p>
-        </p:txBody>
-      </p:sp>
-      <p:sp>
-        <p:nvSpPr>
-          <p:cNvPr id="69" name="TextBox 68"/>
-          <p:cNvSpPr txBox="1"/>
-          <p:nvPr/>
-        </p:nvSpPr>
-        <p:spPr>
-          <a:xfrm>
-            <a:off x="15997297" y="15237708"/>
-            <a:ext cx="12281319" cy="3970318"/>
-          </a:xfrm>
-          <a:prstGeom prst="rect">
-            <a:avLst/>
-          </a:prstGeom>
-          <a:noFill/>
-        </p:spPr>
-        <p:txBody>
-          <a:bodyPr wrap="square" rtlCol="0">
-            <a:spAutoFit/>
-          </a:bodyPr>
-          <a:lstStyle/>
-          <a:p>
-            <a:r>
-              <a:rPr lang="en-US" sz="3600" dirty="0" smtClean="0"/>
-              <a:t>(Faculty) The “Robotic</a:t>
-            </a:r>
-            <a:r>
-              <a:rPr lang="en-US" sz="3600" dirty="0"/>
-              <a:t>" </a:t>
-            </a:r>
-            <a:r>
-              <a:rPr lang="en-US" sz="3600" dirty="0" smtClean="0"/>
-              <a:t>Doorman </a:t>
-            </a:r>
-            <a:r>
-              <a:rPr lang="en-US" sz="3600" dirty="0"/>
-              <a:t>project was designed with the needs of </a:t>
-            </a:r>
-            <a:r>
-              <a:rPr lang="en-US" sz="3600" dirty="0" smtClean="0"/>
-              <a:t>each of the project’s shareholders </a:t>
-            </a:r>
-            <a:r>
-              <a:rPr lang="en-US" sz="3600" dirty="0"/>
-              <a:t>in mind.</a:t>
-            </a:r>
-          </a:p>
-          <a:p>
-            <a:endParaRPr lang="en-US" sz="3600" dirty="0" smtClean="0"/>
-          </a:p>
-          <a:p>
-            <a:r>
-              <a:rPr lang="en-US" sz="3600" dirty="0" smtClean="0"/>
-              <a:t>To address the needs of students, (mention door lock mechanism here), </a:t>
-            </a:r>
-          </a:p>
-          <a:p>
-            <a:endParaRPr lang="en-US" sz="3600" dirty="0"/>
-          </a:p>
-          <a:p>
-            <a:r>
-              <a:rPr lang="en-US" sz="3600" dirty="0" smtClean="0"/>
-              <a:t>a mechanism to rotate the doorknob on the inside </a:t>
+              <a:t>Here!</a:t>
             </a:r>
             <a:endParaRPr lang="en-US" sz="3600" dirty="0"/>
           </a:p>
@@ -4877,7 +4757,7 @@
         </p:nvSpPr>
         <p:spPr>
           <a:xfrm>
-            <a:off x="19585767" y="20383322"/>
+            <a:off x="19682021" y="20878800"/>
             <a:ext cx="4450957" cy="646331"/>
           </a:xfrm>
           <a:prstGeom prst="rect">
@@ -4896,12 +4776,79 @@
               <a:t>Some Pictures </a:t>
             </a:r>
             <a:r>
-              <a:rPr lang="en-US" sz="3600" b="1" dirty="0" err="1" smtClean="0"/>
-              <a:t>Heres</a:t>
-            </a:r>
-            <a:r>
               <a:rPr lang="en-US" sz="3600" b="1" dirty="0" smtClean="0"/>
-              <a:t>!</a:t>
+              <a:t>Here!</a:t>
+            </a:r>
+            <a:endParaRPr lang="en-US" sz="3600" dirty="0"/>
+          </a:p>
+        </p:txBody>
+      </p:sp>
+      <p:sp>
+        <p:nvSpPr>
+          <p:cNvPr id="41" name="TextBox 40"/>
+          <p:cNvSpPr txBox="1"/>
+          <p:nvPr/>
+        </p:nvSpPr>
+        <p:spPr>
+          <a:xfrm>
+            <a:off x="14996611" y="14706600"/>
+            <a:ext cx="13991222" cy="4524315"/>
+          </a:xfrm>
+          <a:prstGeom prst="rect">
+            <a:avLst/>
+          </a:prstGeom>
+          <a:noFill/>
+        </p:spPr>
+        <p:txBody>
+          <a:bodyPr wrap="square" lIns="731520" rIns="731520" rtlCol="0">
+            <a:spAutoFit/>
+          </a:bodyPr>
+          <a:lstStyle/>
+          <a:p>
+            <a:r>
+              <a:rPr lang="en-US" sz="3600" dirty="0" smtClean="0"/>
+              <a:t>To </a:t>
+            </a:r>
+            <a:r>
+              <a:rPr lang="en-US" sz="3600" dirty="0" smtClean="0"/>
+              <a:t>address the needs of </a:t>
+            </a:r>
+            <a:r>
+              <a:rPr lang="en-US" sz="3600" dirty="0" smtClean="0"/>
+              <a:t>faculty, the project needed to incorporate security features which would allow for basic access control and accountability through key card logging. </a:t>
+            </a:r>
+            <a:r>
+              <a:rPr lang="en-US" sz="3600" dirty="0" smtClean="0"/>
+              <a:t>Every few minutes, the device checks a whitelist database on a remote server for approved access keys, updates its local database of whitelisted keys, and sends local access logs to the remote server for later review. A web interface on the remote server allows for manual addition/removal of whitelisted keys, and for time-stamped log viewing.</a:t>
+            </a:r>
+          </a:p>
+        </p:txBody>
+      </p:sp>
+      <p:sp>
+        <p:nvSpPr>
+          <p:cNvPr id="42" name="TextBox 41"/>
+          <p:cNvSpPr txBox="1"/>
+          <p:nvPr/>
+        </p:nvSpPr>
+        <p:spPr>
+          <a:xfrm>
+            <a:off x="15009956" y="23317200"/>
+            <a:ext cx="13977877" cy="4524315"/>
+          </a:xfrm>
+          <a:prstGeom prst="rect">
+            <a:avLst/>
+          </a:prstGeom>
+          <a:noFill/>
+        </p:spPr>
+        <p:txBody>
+          <a:bodyPr wrap="square" lIns="731520" rIns="731520" rtlCol="0">
+            <a:spAutoFit/>
+          </a:bodyPr>
+          <a:lstStyle/>
+          <a:p>
+            <a:r>
+              <a:rPr lang="en-US" sz="3600" dirty="0"/>
+              <a:t>To address the needs of the University System, an RFID access system was implemented. This approach solves one of the greatest problems of the traditional door key access system: students losing keys. When a student loses a key, the University has a decision to make: keep the compromised lock and replace the key, or replace both the lock and the key. Neither choice is ideal. By implementing a system with easily-replaceable keys, both of these traditional problems are solved.</a:t>
             </a:r>
             <a:endParaRPr lang="en-US" sz="3600" dirty="0"/>
           </a:p>

</xml_diff>

<commit_message>
(2.75/3) Conclusion & Future Work Done
Still needs cost analysis and pictures!
</commit_message>
<xml_diff>
--- a/poster/Poster_v2.pptx
+++ b/poster/Poster_v2.pptx
@@ -7,14 +7,14 @@
   <p:sldIdLst>
     <p:sldId id="256" r:id="rId2"/>
   </p:sldIdLst>
-  <p:sldSz cx="43891200" cy="32918400"/>
-  <p:notesSz cx="6858000" cy="9144000"/>
+  <p:sldSz cx="51206400" cy="38404800"/>
+  <p:notesSz cx="9144000" cy="6858000"/>
   <p:defaultTextStyle>
     <a:defPPr>
       <a:defRPr lang="en-US"/>
     </a:defPPr>
-    <a:lvl1pPr marL="0" algn="l" defTabSz="4389120" rtl="0" eaLnBrk="1" latinLnBrk="0" hangingPunct="1">
-      <a:defRPr sz="8600" kern="1200">
+    <a:lvl1pPr marL="0" algn="l" defTabSz="5120347" rtl="0" eaLnBrk="1" latinLnBrk="0" hangingPunct="1">
+      <a:defRPr sz="10033" kern="1200">
         <a:solidFill>
           <a:schemeClr val="tx1"/>
         </a:solidFill>
@@ -23,8 +23,8 @@
         <a:cs typeface="+mn-cs"/>
       </a:defRPr>
     </a:lvl1pPr>
-    <a:lvl2pPr marL="2194560" algn="l" defTabSz="4389120" rtl="0" eaLnBrk="1" latinLnBrk="0" hangingPunct="1">
-      <a:defRPr sz="8600" kern="1200">
+    <a:lvl2pPr marL="2560174" algn="l" defTabSz="5120347" rtl="0" eaLnBrk="1" latinLnBrk="0" hangingPunct="1">
+      <a:defRPr sz="10033" kern="1200">
         <a:solidFill>
           <a:schemeClr val="tx1"/>
         </a:solidFill>
@@ -33,8 +33,8 @@
         <a:cs typeface="+mn-cs"/>
       </a:defRPr>
     </a:lvl2pPr>
-    <a:lvl3pPr marL="4389120" algn="l" defTabSz="4389120" rtl="0" eaLnBrk="1" latinLnBrk="0" hangingPunct="1">
-      <a:defRPr sz="8600" kern="1200">
+    <a:lvl3pPr marL="5120347" algn="l" defTabSz="5120347" rtl="0" eaLnBrk="1" latinLnBrk="0" hangingPunct="1">
+      <a:defRPr sz="10033" kern="1200">
         <a:solidFill>
           <a:schemeClr val="tx1"/>
         </a:solidFill>
@@ -43,8 +43,8 @@
         <a:cs typeface="+mn-cs"/>
       </a:defRPr>
     </a:lvl3pPr>
-    <a:lvl4pPr marL="6583680" algn="l" defTabSz="4389120" rtl="0" eaLnBrk="1" latinLnBrk="0" hangingPunct="1">
-      <a:defRPr sz="8600" kern="1200">
+    <a:lvl4pPr marL="7680521" algn="l" defTabSz="5120347" rtl="0" eaLnBrk="1" latinLnBrk="0" hangingPunct="1">
+      <a:defRPr sz="10033" kern="1200">
         <a:solidFill>
           <a:schemeClr val="tx1"/>
         </a:solidFill>
@@ -53,8 +53,8 @@
         <a:cs typeface="+mn-cs"/>
       </a:defRPr>
     </a:lvl4pPr>
-    <a:lvl5pPr marL="8778240" algn="l" defTabSz="4389120" rtl="0" eaLnBrk="1" latinLnBrk="0" hangingPunct="1">
-      <a:defRPr sz="8600" kern="1200">
+    <a:lvl5pPr marL="10240695" algn="l" defTabSz="5120347" rtl="0" eaLnBrk="1" latinLnBrk="0" hangingPunct="1">
+      <a:defRPr sz="10033" kern="1200">
         <a:solidFill>
           <a:schemeClr val="tx1"/>
         </a:solidFill>
@@ -63,8 +63,8 @@
         <a:cs typeface="+mn-cs"/>
       </a:defRPr>
     </a:lvl5pPr>
-    <a:lvl6pPr marL="10972800" algn="l" defTabSz="4389120" rtl="0" eaLnBrk="1" latinLnBrk="0" hangingPunct="1">
-      <a:defRPr sz="8600" kern="1200">
+    <a:lvl6pPr marL="12800868" algn="l" defTabSz="5120347" rtl="0" eaLnBrk="1" latinLnBrk="0" hangingPunct="1">
+      <a:defRPr sz="10033" kern="1200">
         <a:solidFill>
           <a:schemeClr val="tx1"/>
         </a:solidFill>
@@ -73,8 +73,8 @@
         <a:cs typeface="+mn-cs"/>
       </a:defRPr>
     </a:lvl6pPr>
-    <a:lvl7pPr marL="13167360" algn="l" defTabSz="4389120" rtl="0" eaLnBrk="1" latinLnBrk="0" hangingPunct="1">
-      <a:defRPr sz="8600" kern="1200">
+    <a:lvl7pPr marL="15361042" algn="l" defTabSz="5120347" rtl="0" eaLnBrk="1" latinLnBrk="0" hangingPunct="1">
+      <a:defRPr sz="10033" kern="1200">
         <a:solidFill>
           <a:schemeClr val="tx1"/>
         </a:solidFill>
@@ -83,8 +83,8 @@
         <a:cs typeface="+mn-cs"/>
       </a:defRPr>
     </a:lvl7pPr>
-    <a:lvl8pPr marL="15361920" algn="l" defTabSz="4389120" rtl="0" eaLnBrk="1" latinLnBrk="0" hangingPunct="1">
-      <a:defRPr sz="8600" kern="1200">
+    <a:lvl8pPr marL="17921216" algn="l" defTabSz="5120347" rtl="0" eaLnBrk="1" latinLnBrk="0" hangingPunct="1">
+      <a:defRPr sz="10033" kern="1200">
         <a:solidFill>
           <a:schemeClr val="tx1"/>
         </a:solidFill>
@@ -93,8 +93,8 @@
         <a:cs typeface="+mn-cs"/>
       </a:defRPr>
     </a:lvl8pPr>
-    <a:lvl9pPr marL="17556480" algn="l" defTabSz="4389120" rtl="0" eaLnBrk="1" latinLnBrk="0" hangingPunct="1">
-      <a:defRPr sz="8600" kern="1200">
+    <a:lvl9pPr marL="20481390" algn="l" defTabSz="5120347" rtl="0" eaLnBrk="1" latinLnBrk="0" hangingPunct="1">
+      <a:defRPr sz="10033" kern="1200">
         <a:solidFill>
           <a:schemeClr val="tx1"/>
         </a:solidFill>
@@ -107,12 +107,12 @@
   <p:extLst>
     <p:ext uri="{EFAFB233-063F-42B5-8137-9DF3F51BA10A}">
       <p15:sldGuideLst xmlns:p15="http://schemas.microsoft.com/office/powerpoint/2012/main">
-        <p15:guide id="1" orient="horz" pos="10368">
+        <p15:guide id="1" orient="horz" pos="12096" userDrawn="1">
           <p15:clr>
             <a:srgbClr val="A4A3A4"/>
           </p15:clr>
         </p15:guide>
-        <p15:guide id="2" pos="13824">
+        <p15:guide id="2" pos="16128" userDrawn="1">
           <p15:clr>
             <a:srgbClr val="A4A3A4"/>
           </p15:clr>
@@ -152,8 +152,8 @@
         </p:nvSpPr>
         <p:spPr>
           <a:xfrm>
-            <a:off x="3291840" y="10226042"/>
-            <a:ext cx="37307520" cy="7056120"/>
+            <a:off x="3840480" y="11930382"/>
+            <a:ext cx="43525440" cy="8232140"/>
           </a:xfrm>
         </p:spPr>
         <p:txBody>
@@ -180,8 +180,8 @@
         </p:nvSpPr>
         <p:spPr>
           <a:xfrm>
-            <a:off x="6583680" y="18653760"/>
-            <a:ext cx="30723840" cy="8412480"/>
+            <a:off x="7680960" y="21762720"/>
+            <a:ext cx="35844480" cy="9814560"/>
           </a:xfrm>
         </p:spPr>
         <p:txBody>
@@ -197,7 +197,7 @@
                 </a:solidFill>
               </a:defRPr>
             </a:lvl1pPr>
-            <a:lvl2pPr marL="2194560" indent="0" algn="ctr">
+            <a:lvl2pPr marL="2560393" indent="0" algn="ctr">
               <a:buNone/>
               <a:defRPr>
                 <a:solidFill>
@@ -207,7 +207,7 @@
                 </a:solidFill>
               </a:defRPr>
             </a:lvl2pPr>
-            <a:lvl3pPr marL="4389120" indent="0" algn="ctr">
+            <a:lvl3pPr marL="5120786" indent="0" algn="ctr">
               <a:buNone/>
               <a:defRPr>
                 <a:solidFill>
@@ -217,7 +217,7 @@
                 </a:solidFill>
               </a:defRPr>
             </a:lvl3pPr>
-            <a:lvl4pPr marL="6583680" indent="0" algn="ctr">
+            <a:lvl4pPr marL="7681179" indent="0" algn="ctr">
               <a:buNone/>
               <a:defRPr>
                 <a:solidFill>
@@ -227,7 +227,7 @@
                 </a:solidFill>
               </a:defRPr>
             </a:lvl4pPr>
-            <a:lvl5pPr marL="8778240" indent="0" algn="ctr">
+            <a:lvl5pPr marL="10241573" indent="0" algn="ctr">
               <a:buNone/>
               <a:defRPr>
                 <a:solidFill>
@@ -237,7 +237,7 @@
                 </a:solidFill>
               </a:defRPr>
             </a:lvl5pPr>
-            <a:lvl6pPr marL="10972800" indent="0" algn="ctr">
+            <a:lvl6pPr marL="12801966" indent="0" algn="ctr">
               <a:buNone/>
               <a:defRPr>
                 <a:solidFill>
@@ -247,7 +247,7 @@
                 </a:solidFill>
               </a:defRPr>
             </a:lvl6pPr>
-            <a:lvl7pPr marL="13167360" indent="0" algn="ctr">
+            <a:lvl7pPr marL="15362359" indent="0" algn="ctr">
               <a:buNone/>
               <a:defRPr>
                 <a:solidFill>
@@ -257,7 +257,7 @@
                 </a:solidFill>
               </a:defRPr>
             </a:lvl7pPr>
-            <a:lvl8pPr marL="15361920" indent="0" algn="ctr">
+            <a:lvl8pPr marL="17922752" indent="0" algn="ctr">
               <a:buNone/>
               <a:defRPr>
                 <a:solidFill>
@@ -267,7 +267,7 @@
                 </a:solidFill>
               </a:defRPr>
             </a:lvl8pPr>
-            <a:lvl9pPr marL="17556480" indent="0" algn="ctr">
+            <a:lvl9pPr marL="20483145" indent="0" algn="ctr">
               <a:buNone/>
               <a:defRPr>
                 <a:solidFill>
@@ -305,7 +305,7 @@
             <a:fld id="{35D5C8AE-1ECE-4A4A-8416-EADDD35C2323}" type="datetimeFigureOut">
               <a:rPr lang="en-US" smtClean="0"/>
               <a:pPr/>
-              <a:t>4/19/2014</a:t>
+              <a:t>4/21/2014</a:t>
             </a:fld>
             <a:endParaRPr lang="en-US"/>
           </a:p>
@@ -477,7 +477,7 @@
             <a:fld id="{35D5C8AE-1ECE-4A4A-8416-EADDD35C2323}" type="datetimeFigureOut">
               <a:rPr lang="en-US" smtClean="0"/>
               <a:pPr/>
-              <a:t>4/19/2014</a:t>
+              <a:t>4/21/2014</a:t>
             </a:fld>
             <a:endParaRPr lang="en-US"/>
           </a:p>
@@ -568,8 +568,8 @@
         </p:nvSpPr>
         <p:spPr>
           <a:xfrm>
-            <a:off x="31821120" y="1318265"/>
-            <a:ext cx="9875520" cy="28087320"/>
+            <a:off x="37124640" y="1537976"/>
+            <a:ext cx="11521440" cy="32768540"/>
           </a:xfrm>
         </p:spPr>
         <p:txBody>
@@ -596,8 +596,8 @@
         </p:nvSpPr>
         <p:spPr>
           <a:xfrm>
-            <a:off x="2194560" y="1318265"/>
-            <a:ext cx="28895040" cy="28087320"/>
+            <a:off x="2560320" y="1537976"/>
+            <a:ext cx="33710880" cy="32768540"/>
           </a:xfrm>
         </p:spPr>
         <p:txBody>
@@ -659,7 +659,7 @@
             <a:fld id="{35D5C8AE-1ECE-4A4A-8416-EADDD35C2323}" type="datetimeFigureOut">
               <a:rPr lang="en-US" smtClean="0"/>
               <a:pPr/>
-              <a:t>4/19/2014</a:t>
+              <a:t>4/21/2014</a:t>
             </a:fld>
             <a:endParaRPr lang="en-US"/>
           </a:p>
@@ -831,7 +831,7 @@
             <a:fld id="{35D5C8AE-1ECE-4A4A-8416-EADDD35C2323}" type="datetimeFigureOut">
               <a:rPr lang="en-US" smtClean="0"/>
               <a:pPr/>
-              <a:t>4/19/2014</a:t>
+              <a:t>4/21/2014</a:t>
             </a:fld>
             <a:endParaRPr lang="en-US"/>
           </a:p>
@@ -922,15 +922,15 @@
         </p:nvSpPr>
         <p:spPr>
           <a:xfrm>
-            <a:off x="3467102" y="21153122"/>
-            <a:ext cx="37307520" cy="6537960"/>
+            <a:off x="4044952" y="24678642"/>
+            <a:ext cx="43525440" cy="7627620"/>
           </a:xfrm>
         </p:spPr>
         <p:txBody>
           <a:bodyPr anchor="t"/>
           <a:lstStyle>
             <a:lvl1pPr algn="l">
-              <a:defRPr sz="19200" b="1" cap="all"/>
+              <a:defRPr sz="22401" b="1" cap="all"/>
             </a:lvl1pPr>
           </a:lstStyle>
           <a:p>
@@ -954,8 +954,8 @@
         </p:nvSpPr>
         <p:spPr>
           <a:xfrm>
-            <a:off x="3467102" y="13952225"/>
-            <a:ext cx="37307520" cy="7200898"/>
+            <a:off x="4044952" y="16277596"/>
+            <a:ext cx="43525440" cy="8401048"/>
           </a:xfrm>
         </p:spPr>
         <p:txBody>
@@ -963,7 +963,7 @@
           <a:lstStyle>
             <a:lvl1pPr marL="0" indent="0">
               <a:buNone/>
-              <a:defRPr sz="9600">
+              <a:defRPr sz="11200">
                 <a:solidFill>
                   <a:schemeClr val="tx1">
                     <a:tint val="75000"/>
@@ -971,9 +971,9 @@
                 </a:solidFill>
               </a:defRPr>
             </a:lvl1pPr>
-            <a:lvl2pPr marL="2194560" indent="0">
-              <a:buNone/>
-              <a:defRPr sz="8600">
+            <a:lvl2pPr marL="2560393" indent="0">
+              <a:buNone/>
+              <a:defRPr sz="10034">
                 <a:solidFill>
                   <a:schemeClr val="tx1">
                     <a:tint val="75000"/>
@@ -981,9 +981,9 @@
                 </a:solidFill>
               </a:defRPr>
             </a:lvl2pPr>
-            <a:lvl3pPr marL="4389120" indent="0">
-              <a:buNone/>
-              <a:defRPr sz="7700">
+            <a:lvl3pPr marL="5120786" indent="0">
+              <a:buNone/>
+              <a:defRPr sz="8984">
                 <a:solidFill>
                   <a:schemeClr val="tx1">
                     <a:tint val="75000"/>
@@ -991,9 +991,9 @@
                 </a:solidFill>
               </a:defRPr>
             </a:lvl3pPr>
-            <a:lvl4pPr marL="6583680" indent="0">
-              <a:buNone/>
-              <a:defRPr sz="6700">
+            <a:lvl4pPr marL="7681179" indent="0">
+              <a:buNone/>
+              <a:defRPr sz="7817">
                 <a:solidFill>
                   <a:schemeClr val="tx1">
                     <a:tint val="75000"/>
@@ -1001,9 +1001,9 @@
                 </a:solidFill>
               </a:defRPr>
             </a:lvl4pPr>
-            <a:lvl5pPr marL="8778240" indent="0">
-              <a:buNone/>
-              <a:defRPr sz="6700">
+            <a:lvl5pPr marL="10241573" indent="0">
+              <a:buNone/>
+              <a:defRPr sz="7817">
                 <a:solidFill>
                   <a:schemeClr val="tx1">
                     <a:tint val="75000"/>
@@ -1011,9 +1011,9 @@
                 </a:solidFill>
               </a:defRPr>
             </a:lvl5pPr>
-            <a:lvl6pPr marL="10972800" indent="0">
-              <a:buNone/>
-              <a:defRPr sz="6700">
+            <a:lvl6pPr marL="12801966" indent="0">
+              <a:buNone/>
+              <a:defRPr sz="7817">
                 <a:solidFill>
                   <a:schemeClr val="tx1">
                     <a:tint val="75000"/>
@@ -1021,9 +1021,9 @@
                 </a:solidFill>
               </a:defRPr>
             </a:lvl6pPr>
-            <a:lvl7pPr marL="13167360" indent="0">
-              <a:buNone/>
-              <a:defRPr sz="6700">
+            <a:lvl7pPr marL="15362359" indent="0">
+              <a:buNone/>
+              <a:defRPr sz="7817">
                 <a:solidFill>
                   <a:schemeClr val="tx1">
                     <a:tint val="75000"/>
@@ -1031,9 +1031,9 @@
                 </a:solidFill>
               </a:defRPr>
             </a:lvl7pPr>
-            <a:lvl8pPr marL="15361920" indent="0">
-              <a:buNone/>
-              <a:defRPr sz="6700">
+            <a:lvl8pPr marL="17922752" indent="0">
+              <a:buNone/>
+              <a:defRPr sz="7817">
                 <a:solidFill>
                   <a:schemeClr val="tx1">
                     <a:tint val="75000"/>
@@ -1041,9 +1041,9 @@
                 </a:solidFill>
               </a:defRPr>
             </a:lvl8pPr>
-            <a:lvl9pPr marL="17556480" indent="0">
-              <a:buNone/>
-              <a:defRPr sz="6700">
+            <a:lvl9pPr marL="20483145" indent="0">
+              <a:buNone/>
+              <a:defRPr sz="7817">
                 <a:solidFill>
                   <a:schemeClr val="tx1">
                     <a:tint val="75000"/>
@@ -1079,7 +1079,7 @@
             <a:fld id="{35D5C8AE-1ECE-4A4A-8416-EADDD35C2323}" type="datetimeFigureOut">
               <a:rPr lang="en-US" smtClean="0"/>
               <a:pPr/>
-              <a:t>4/19/2014</a:t>
+              <a:t>4/21/2014</a:t>
             </a:fld>
             <a:endParaRPr lang="en-US"/>
           </a:p>
@@ -1193,39 +1193,39 @@
         </p:nvSpPr>
         <p:spPr>
           <a:xfrm>
-            <a:off x="2194560" y="7680963"/>
-            <a:ext cx="19385280" cy="21724622"/>
+            <a:off x="2560320" y="8961124"/>
+            <a:ext cx="22616160" cy="25345392"/>
           </a:xfrm>
         </p:spPr>
         <p:txBody>
           <a:bodyPr/>
           <a:lstStyle>
             <a:lvl1pPr>
-              <a:defRPr sz="13400"/>
+              <a:defRPr sz="15634"/>
             </a:lvl1pPr>
             <a:lvl2pPr>
-              <a:defRPr sz="11500"/>
+              <a:defRPr sz="13417"/>
             </a:lvl2pPr>
             <a:lvl3pPr>
-              <a:defRPr sz="9600"/>
+              <a:defRPr sz="11200"/>
             </a:lvl3pPr>
             <a:lvl4pPr>
-              <a:defRPr sz="8600"/>
+              <a:defRPr sz="10034"/>
             </a:lvl4pPr>
             <a:lvl5pPr>
-              <a:defRPr sz="8600"/>
+              <a:defRPr sz="10034"/>
             </a:lvl5pPr>
             <a:lvl6pPr>
-              <a:defRPr sz="8600"/>
+              <a:defRPr sz="10034"/>
             </a:lvl6pPr>
             <a:lvl7pPr>
-              <a:defRPr sz="8600"/>
+              <a:defRPr sz="10034"/>
             </a:lvl7pPr>
             <a:lvl8pPr>
-              <a:defRPr sz="8600"/>
+              <a:defRPr sz="10034"/>
             </a:lvl8pPr>
             <a:lvl9pPr>
-              <a:defRPr sz="8600"/>
+              <a:defRPr sz="10034"/>
             </a:lvl9pPr>
           </a:lstStyle>
           <a:p>
@@ -1278,39 +1278,39 @@
         </p:nvSpPr>
         <p:spPr>
           <a:xfrm>
-            <a:off x="22311360" y="7680963"/>
-            <a:ext cx="19385280" cy="21724622"/>
+            <a:off x="26029920" y="8961124"/>
+            <a:ext cx="22616160" cy="25345392"/>
           </a:xfrm>
         </p:spPr>
         <p:txBody>
           <a:bodyPr/>
           <a:lstStyle>
             <a:lvl1pPr>
-              <a:defRPr sz="13400"/>
+              <a:defRPr sz="15634"/>
             </a:lvl1pPr>
             <a:lvl2pPr>
-              <a:defRPr sz="11500"/>
+              <a:defRPr sz="13417"/>
             </a:lvl2pPr>
             <a:lvl3pPr>
-              <a:defRPr sz="9600"/>
+              <a:defRPr sz="11200"/>
             </a:lvl3pPr>
             <a:lvl4pPr>
-              <a:defRPr sz="8600"/>
+              <a:defRPr sz="10034"/>
             </a:lvl4pPr>
             <a:lvl5pPr>
-              <a:defRPr sz="8600"/>
+              <a:defRPr sz="10034"/>
             </a:lvl5pPr>
             <a:lvl6pPr>
-              <a:defRPr sz="8600"/>
+              <a:defRPr sz="10034"/>
             </a:lvl6pPr>
             <a:lvl7pPr>
-              <a:defRPr sz="8600"/>
+              <a:defRPr sz="10034"/>
             </a:lvl7pPr>
             <a:lvl8pPr>
-              <a:defRPr sz="8600"/>
+              <a:defRPr sz="10034"/>
             </a:lvl8pPr>
             <a:lvl9pPr>
-              <a:defRPr sz="8600"/>
+              <a:defRPr sz="10034"/>
             </a:lvl9pPr>
           </a:lstStyle>
           <a:p>
@@ -1369,7 +1369,7 @@
             <a:fld id="{35D5C8AE-1ECE-4A4A-8416-EADDD35C2323}" type="datetimeFigureOut">
               <a:rPr lang="en-US" smtClean="0"/>
               <a:pPr/>
-              <a:t>4/19/2014</a:t>
+              <a:t>4/21/2014</a:t>
             </a:fld>
             <a:endParaRPr lang="en-US"/>
           </a:p>
@@ -1487,8 +1487,8 @@
         </p:nvSpPr>
         <p:spPr>
           <a:xfrm>
-            <a:off x="2194560" y="7368542"/>
-            <a:ext cx="19392902" cy="3070858"/>
+            <a:off x="2560320" y="8596632"/>
+            <a:ext cx="22625052" cy="3582668"/>
           </a:xfrm>
         </p:spPr>
         <p:txBody>
@@ -1496,39 +1496,39 @@
           <a:lstStyle>
             <a:lvl1pPr marL="0" indent="0">
               <a:buNone/>
-              <a:defRPr sz="11500" b="1"/>
+              <a:defRPr sz="13417" b="1"/>
             </a:lvl1pPr>
-            <a:lvl2pPr marL="2194560" indent="0">
-              <a:buNone/>
-              <a:defRPr sz="9600" b="1"/>
+            <a:lvl2pPr marL="2560393" indent="0">
+              <a:buNone/>
+              <a:defRPr sz="11200" b="1"/>
             </a:lvl2pPr>
-            <a:lvl3pPr marL="4389120" indent="0">
-              <a:buNone/>
-              <a:defRPr sz="8600" b="1"/>
+            <a:lvl3pPr marL="5120786" indent="0">
+              <a:buNone/>
+              <a:defRPr sz="10034" b="1"/>
             </a:lvl3pPr>
-            <a:lvl4pPr marL="6583680" indent="0">
-              <a:buNone/>
-              <a:defRPr sz="7700" b="1"/>
+            <a:lvl4pPr marL="7681179" indent="0">
+              <a:buNone/>
+              <a:defRPr sz="8984" b="1"/>
             </a:lvl4pPr>
-            <a:lvl5pPr marL="8778240" indent="0">
-              <a:buNone/>
-              <a:defRPr sz="7700" b="1"/>
+            <a:lvl5pPr marL="10241573" indent="0">
+              <a:buNone/>
+              <a:defRPr sz="8984" b="1"/>
             </a:lvl5pPr>
-            <a:lvl6pPr marL="10972800" indent="0">
-              <a:buNone/>
-              <a:defRPr sz="7700" b="1"/>
+            <a:lvl6pPr marL="12801966" indent="0">
+              <a:buNone/>
+              <a:defRPr sz="8984" b="1"/>
             </a:lvl6pPr>
-            <a:lvl7pPr marL="13167360" indent="0">
-              <a:buNone/>
-              <a:defRPr sz="7700" b="1"/>
+            <a:lvl7pPr marL="15362359" indent="0">
+              <a:buNone/>
+              <a:defRPr sz="8984" b="1"/>
             </a:lvl7pPr>
-            <a:lvl8pPr marL="15361920" indent="0">
-              <a:buNone/>
-              <a:defRPr sz="7700" b="1"/>
+            <a:lvl8pPr marL="17922752" indent="0">
+              <a:buNone/>
+              <a:defRPr sz="8984" b="1"/>
             </a:lvl8pPr>
-            <a:lvl9pPr marL="17556480" indent="0">
-              <a:buNone/>
-              <a:defRPr sz="7700" b="1"/>
+            <a:lvl9pPr marL="20483145" indent="0">
+              <a:buNone/>
+              <a:defRPr sz="8984" b="1"/>
             </a:lvl9pPr>
           </a:lstStyle>
           <a:p>
@@ -1552,39 +1552,39 @@
         </p:nvSpPr>
         <p:spPr>
           <a:xfrm>
-            <a:off x="2194560" y="10439400"/>
-            <a:ext cx="19392902" cy="18966182"/>
+            <a:off x="2560320" y="12179300"/>
+            <a:ext cx="22625052" cy="22127212"/>
           </a:xfrm>
         </p:spPr>
         <p:txBody>
           <a:bodyPr/>
           <a:lstStyle>
             <a:lvl1pPr>
-              <a:defRPr sz="11500"/>
+              <a:defRPr sz="13417"/>
             </a:lvl1pPr>
             <a:lvl2pPr>
-              <a:defRPr sz="9600"/>
+              <a:defRPr sz="11200"/>
             </a:lvl2pPr>
             <a:lvl3pPr>
-              <a:defRPr sz="8600"/>
+              <a:defRPr sz="10034"/>
             </a:lvl3pPr>
             <a:lvl4pPr>
-              <a:defRPr sz="7700"/>
+              <a:defRPr sz="8984"/>
             </a:lvl4pPr>
             <a:lvl5pPr>
-              <a:defRPr sz="7700"/>
+              <a:defRPr sz="8984"/>
             </a:lvl5pPr>
             <a:lvl6pPr>
-              <a:defRPr sz="7700"/>
+              <a:defRPr sz="8984"/>
             </a:lvl6pPr>
             <a:lvl7pPr>
-              <a:defRPr sz="7700"/>
+              <a:defRPr sz="8984"/>
             </a:lvl7pPr>
             <a:lvl8pPr>
-              <a:defRPr sz="7700"/>
+              <a:defRPr sz="8984"/>
             </a:lvl8pPr>
             <a:lvl9pPr>
-              <a:defRPr sz="7700"/>
+              <a:defRPr sz="8984"/>
             </a:lvl9pPr>
           </a:lstStyle>
           <a:p>
@@ -1637,8 +1637,8 @@
         </p:nvSpPr>
         <p:spPr>
           <a:xfrm>
-            <a:off x="22296122" y="7368542"/>
-            <a:ext cx="19400520" cy="3070858"/>
+            <a:off x="26012142" y="8596632"/>
+            <a:ext cx="22633940" cy="3582668"/>
           </a:xfrm>
         </p:spPr>
         <p:txBody>
@@ -1646,39 +1646,39 @@
           <a:lstStyle>
             <a:lvl1pPr marL="0" indent="0">
               <a:buNone/>
-              <a:defRPr sz="11500" b="1"/>
+              <a:defRPr sz="13417" b="1"/>
             </a:lvl1pPr>
-            <a:lvl2pPr marL="2194560" indent="0">
-              <a:buNone/>
-              <a:defRPr sz="9600" b="1"/>
+            <a:lvl2pPr marL="2560393" indent="0">
+              <a:buNone/>
+              <a:defRPr sz="11200" b="1"/>
             </a:lvl2pPr>
-            <a:lvl3pPr marL="4389120" indent="0">
-              <a:buNone/>
-              <a:defRPr sz="8600" b="1"/>
+            <a:lvl3pPr marL="5120786" indent="0">
+              <a:buNone/>
+              <a:defRPr sz="10034" b="1"/>
             </a:lvl3pPr>
-            <a:lvl4pPr marL="6583680" indent="0">
-              <a:buNone/>
-              <a:defRPr sz="7700" b="1"/>
+            <a:lvl4pPr marL="7681179" indent="0">
+              <a:buNone/>
+              <a:defRPr sz="8984" b="1"/>
             </a:lvl4pPr>
-            <a:lvl5pPr marL="8778240" indent="0">
-              <a:buNone/>
-              <a:defRPr sz="7700" b="1"/>
+            <a:lvl5pPr marL="10241573" indent="0">
+              <a:buNone/>
+              <a:defRPr sz="8984" b="1"/>
             </a:lvl5pPr>
-            <a:lvl6pPr marL="10972800" indent="0">
-              <a:buNone/>
-              <a:defRPr sz="7700" b="1"/>
+            <a:lvl6pPr marL="12801966" indent="0">
+              <a:buNone/>
+              <a:defRPr sz="8984" b="1"/>
             </a:lvl6pPr>
-            <a:lvl7pPr marL="13167360" indent="0">
-              <a:buNone/>
-              <a:defRPr sz="7700" b="1"/>
+            <a:lvl7pPr marL="15362359" indent="0">
+              <a:buNone/>
+              <a:defRPr sz="8984" b="1"/>
             </a:lvl7pPr>
-            <a:lvl8pPr marL="15361920" indent="0">
-              <a:buNone/>
-              <a:defRPr sz="7700" b="1"/>
+            <a:lvl8pPr marL="17922752" indent="0">
+              <a:buNone/>
+              <a:defRPr sz="8984" b="1"/>
             </a:lvl8pPr>
-            <a:lvl9pPr marL="17556480" indent="0">
-              <a:buNone/>
-              <a:defRPr sz="7700" b="1"/>
+            <a:lvl9pPr marL="20483145" indent="0">
+              <a:buNone/>
+              <a:defRPr sz="8984" b="1"/>
             </a:lvl9pPr>
           </a:lstStyle>
           <a:p>
@@ -1702,39 +1702,39 @@
         </p:nvSpPr>
         <p:spPr>
           <a:xfrm>
-            <a:off x="22296122" y="10439400"/>
-            <a:ext cx="19400520" cy="18966182"/>
+            <a:off x="26012142" y="12179300"/>
+            <a:ext cx="22633940" cy="22127212"/>
           </a:xfrm>
         </p:spPr>
         <p:txBody>
           <a:bodyPr/>
           <a:lstStyle>
             <a:lvl1pPr>
-              <a:defRPr sz="11500"/>
+              <a:defRPr sz="13417"/>
             </a:lvl1pPr>
             <a:lvl2pPr>
-              <a:defRPr sz="9600"/>
+              <a:defRPr sz="11200"/>
             </a:lvl2pPr>
             <a:lvl3pPr>
-              <a:defRPr sz="8600"/>
+              <a:defRPr sz="10034"/>
             </a:lvl3pPr>
             <a:lvl4pPr>
-              <a:defRPr sz="7700"/>
+              <a:defRPr sz="8984"/>
             </a:lvl4pPr>
             <a:lvl5pPr>
-              <a:defRPr sz="7700"/>
+              <a:defRPr sz="8984"/>
             </a:lvl5pPr>
             <a:lvl6pPr>
-              <a:defRPr sz="7700"/>
+              <a:defRPr sz="8984"/>
             </a:lvl6pPr>
             <a:lvl7pPr>
-              <a:defRPr sz="7700"/>
+              <a:defRPr sz="8984"/>
             </a:lvl7pPr>
             <a:lvl8pPr>
-              <a:defRPr sz="7700"/>
+              <a:defRPr sz="8984"/>
             </a:lvl8pPr>
             <a:lvl9pPr>
-              <a:defRPr sz="7700"/>
+              <a:defRPr sz="8984"/>
             </a:lvl9pPr>
           </a:lstStyle>
           <a:p>
@@ -1793,7 +1793,7 @@
             <a:fld id="{35D5C8AE-1ECE-4A4A-8416-EADDD35C2323}" type="datetimeFigureOut">
               <a:rPr lang="en-US" smtClean="0"/>
               <a:pPr/>
-              <a:t>4/19/2014</a:t>
+              <a:t>4/21/2014</a:t>
             </a:fld>
             <a:endParaRPr lang="en-US"/>
           </a:p>
@@ -1913,7 +1913,7 @@
             <a:fld id="{35D5C8AE-1ECE-4A4A-8416-EADDD35C2323}" type="datetimeFigureOut">
               <a:rPr lang="en-US" smtClean="0"/>
               <a:pPr/>
-              <a:t>4/19/2014</a:t>
+              <a:t>4/21/2014</a:t>
             </a:fld>
             <a:endParaRPr lang="en-US"/>
           </a:p>
@@ -2010,7 +2010,7 @@
             <a:fld id="{35D5C8AE-1ECE-4A4A-8416-EADDD35C2323}" type="datetimeFigureOut">
               <a:rPr lang="en-US" smtClean="0"/>
               <a:pPr/>
-              <a:t>4/19/2014</a:t>
+              <a:t>4/21/2014</a:t>
             </a:fld>
             <a:endParaRPr lang="en-US"/>
           </a:p>
@@ -2101,15 +2101,15 @@
         </p:nvSpPr>
         <p:spPr>
           <a:xfrm>
-            <a:off x="2194563" y="1310640"/>
-            <a:ext cx="14439902" cy="5577840"/>
+            <a:off x="2560324" y="1529080"/>
+            <a:ext cx="16846552" cy="6507480"/>
           </a:xfrm>
         </p:spPr>
         <p:txBody>
           <a:bodyPr anchor="b"/>
           <a:lstStyle>
             <a:lvl1pPr algn="l">
-              <a:defRPr sz="9600" b="1"/>
+              <a:defRPr sz="11200" b="1"/>
             </a:lvl1pPr>
           </a:lstStyle>
           <a:p>
@@ -2133,39 +2133,39 @@
         </p:nvSpPr>
         <p:spPr>
           <a:xfrm>
-            <a:off x="17160240" y="1310643"/>
-            <a:ext cx="24536400" cy="28094942"/>
+            <a:off x="20020280" y="1529084"/>
+            <a:ext cx="28625800" cy="32777432"/>
           </a:xfrm>
         </p:spPr>
         <p:txBody>
           <a:bodyPr/>
           <a:lstStyle>
             <a:lvl1pPr>
-              <a:defRPr sz="15400"/>
+              <a:defRPr sz="17967"/>
             </a:lvl1pPr>
             <a:lvl2pPr>
-              <a:defRPr sz="13400"/>
+              <a:defRPr sz="15634"/>
             </a:lvl2pPr>
             <a:lvl3pPr>
-              <a:defRPr sz="11500"/>
+              <a:defRPr sz="13417"/>
             </a:lvl3pPr>
             <a:lvl4pPr>
-              <a:defRPr sz="9600"/>
+              <a:defRPr sz="11200"/>
             </a:lvl4pPr>
             <a:lvl5pPr>
-              <a:defRPr sz="9600"/>
+              <a:defRPr sz="11200"/>
             </a:lvl5pPr>
             <a:lvl6pPr>
-              <a:defRPr sz="9600"/>
+              <a:defRPr sz="11200"/>
             </a:lvl6pPr>
             <a:lvl7pPr>
-              <a:defRPr sz="9600"/>
+              <a:defRPr sz="11200"/>
             </a:lvl7pPr>
             <a:lvl8pPr>
-              <a:defRPr sz="9600"/>
+              <a:defRPr sz="11200"/>
             </a:lvl8pPr>
             <a:lvl9pPr>
-              <a:defRPr sz="9600"/>
+              <a:defRPr sz="11200"/>
             </a:lvl9pPr>
           </a:lstStyle>
           <a:p>
@@ -2218,8 +2218,8 @@
         </p:nvSpPr>
         <p:spPr>
           <a:xfrm>
-            <a:off x="2194563" y="6888483"/>
-            <a:ext cx="14439902" cy="22517102"/>
+            <a:off x="2560324" y="8036564"/>
+            <a:ext cx="16846552" cy="26269952"/>
           </a:xfrm>
         </p:spPr>
         <p:txBody>
@@ -2227,39 +2227,39 @@
           <a:lstStyle>
             <a:lvl1pPr marL="0" indent="0">
               <a:buNone/>
-              <a:defRPr sz="6700"/>
+              <a:defRPr sz="7817"/>
             </a:lvl1pPr>
-            <a:lvl2pPr marL="2194560" indent="0">
-              <a:buNone/>
-              <a:defRPr sz="5800"/>
+            <a:lvl2pPr marL="2560393" indent="0">
+              <a:buNone/>
+              <a:defRPr sz="6767"/>
             </a:lvl2pPr>
-            <a:lvl3pPr marL="4389120" indent="0">
-              <a:buNone/>
-              <a:defRPr sz="4800"/>
+            <a:lvl3pPr marL="5120786" indent="0">
+              <a:buNone/>
+              <a:defRPr sz="5600"/>
             </a:lvl3pPr>
-            <a:lvl4pPr marL="6583680" indent="0">
-              <a:buNone/>
-              <a:defRPr sz="4300"/>
+            <a:lvl4pPr marL="7681179" indent="0">
+              <a:buNone/>
+              <a:defRPr sz="5017"/>
             </a:lvl4pPr>
-            <a:lvl5pPr marL="8778240" indent="0">
-              <a:buNone/>
-              <a:defRPr sz="4300"/>
+            <a:lvl5pPr marL="10241573" indent="0">
+              <a:buNone/>
+              <a:defRPr sz="5017"/>
             </a:lvl5pPr>
-            <a:lvl6pPr marL="10972800" indent="0">
-              <a:buNone/>
-              <a:defRPr sz="4300"/>
+            <a:lvl6pPr marL="12801966" indent="0">
+              <a:buNone/>
+              <a:defRPr sz="5017"/>
             </a:lvl6pPr>
-            <a:lvl7pPr marL="13167360" indent="0">
-              <a:buNone/>
-              <a:defRPr sz="4300"/>
+            <a:lvl7pPr marL="15362359" indent="0">
+              <a:buNone/>
+              <a:defRPr sz="5017"/>
             </a:lvl7pPr>
-            <a:lvl8pPr marL="15361920" indent="0">
-              <a:buNone/>
-              <a:defRPr sz="4300"/>
+            <a:lvl8pPr marL="17922752" indent="0">
+              <a:buNone/>
+              <a:defRPr sz="5017"/>
             </a:lvl8pPr>
-            <a:lvl9pPr marL="17556480" indent="0">
-              <a:buNone/>
-              <a:defRPr sz="4300"/>
+            <a:lvl9pPr marL="20483145" indent="0">
+              <a:buNone/>
+              <a:defRPr sz="5017"/>
             </a:lvl9pPr>
           </a:lstStyle>
           <a:p>
@@ -2289,7 +2289,7 @@
             <a:fld id="{35D5C8AE-1ECE-4A4A-8416-EADDD35C2323}" type="datetimeFigureOut">
               <a:rPr lang="en-US" smtClean="0"/>
               <a:pPr/>
-              <a:t>4/19/2014</a:t>
+              <a:t>4/21/2014</a:t>
             </a:fld>
             <a:endParaRPr lang="en-US"/>
           </a:p>
@@ -2380,15 +2380,15 @@
         </p:nvSpPr>
         <p:spPr>
           <a:xfrm>
-            <a:off x="8602982" y="23042880"/>
-            <a:ext cx="26334720" cy="2720342"/>
+            <a:off x="10036812" y="26883360"/>
+            <a:ext cx="30723840" cy="3173732"/>
           </a:xfrm>
         </p:spPr>
         <p:txBody>
           <a:bodyPr anchor="b"/>
           <a:lstStyle>
             <a:lvl1pPr algn="l">
-              <a:defRPr sz="9600" b="1"/>
+              <a:defRPr sz="11200" b="1"/>
             </a:lvl1pPr>
           </a:lstStyle>
           <a:p>
@@ -2412,8 +2412,8 @@
         </p:nvSpPr>
         <p:spPr>
           <a:xfrm>
-            <a:off x="8602982" y="2941320"/>
-            <a:ext cx="26334720" cy="19751040"/>
+            <a:off x="10036812" y="3431540"/>
+            <a:ext cx="30723840" cy="23042880"/>
           </a:xfrm>
         </p:spPr>
         <p:txBody>
@@ -2421,39 +2421,39 @@
           <a:lstStyle>
             <a:lvl1pPr marL="0" indent="0">
               <a:buNone/>
-              <a:defRPr sz="15400"/>
+              <a:defRPr sz="17967"/>
             </a:lvl1pPr>
-            <a:lvl2pPr marL="2194560" indent="0">
-              <a:buNone/>
-              <a:defRPr sz="13400"/>
+            <a:lvl2pPr marL="2560393" indent="0">
+              <a:buNone/>
+              <a:defRPr sz="15634"/>
             </a:lvl2pPr>
-            <a:lvl3pPr marL="4389120" indent="0">
-              <a:buNone/>
-              <a:defRPr sz="11500"/>
+            <a:lvl3pPr marL="5120786" indent="0">
+              <a:buNone/>
+              <a:defRPr sz="13417"/>
             </a:lvl3pPr>
-            <a:lvl4pPr marL="6583680" indent="0">
-              <a:buNone/>
-              <a:defRPr sz="9600"/>
+            <a:lvl4pPr marL="7681179" indent="0">
+              <a:buNone/>
+              <a:defRPr sz="11200"/>
             </a:lvl4pPr>
-            <a:lvl5pPr marL="8778240" indent="0">
-              <a:buNone/>
-              <a:defRPr sz="9600"/>
+            <a:lvl5pPr marL="10241573" indent="0">
+              <a:buNone/>
+              <a:defRPr sz="11200"/>
             </a:lvl5pPr>
-            <a:lvl6pPr marL="10972800" indent="0">
-              <a:buNone/>
-              <a:defRPr sz="9600"/>
+            <a:lvl6pPr marL="12801966" indent="0">
+              <a:buNone/>
+              <a:defRPr sz="11200"/>
             </a:lvl6pPr>
-            <a:lvl7pPr marL="13167360" indent="0">
-              <a:buNone/>
-              <a:defRPr sz="9600"/>
+            <a:lvl7pPr marL="15362359" indent="0">
+              <a:buNone/>
+              <a:defRPr sz="11200"/>
             </a:lvl7pPr>
-            <a:lvl8pPr marL="15361920" indent="0">
-              <a:buNone/>
-              <a:defRPr sz="9600"/>
+            <a:lvl8pPr marL="17922752" indent="0">
+              <a:buNone/>
+              <a:defRPr sz="11200"/>
             </a:lvl8pPr>
-            <a:lvl9pPr marL="17556480" indent="0">
-              <a:buNone/>
-              <a:defRPr sz="9600"/>
+            <a:lvl9pPr marL="20483145" indent="0">
+              <a:buNone/>
+              <a:defRPr sz="11200"/>
             </a:lvl9pPr>
           </a:lstStyle>
           <a:p>
@@ -2473,8 +2473,8 @@
         </p:nvSpPr>
         <p:spPr>
           <a:xfrm>
-            <a:off x="8602982" y="25763222"/>
-            <a:ext cx="26334720" cy="3863338"/>
+            <a:off x="10036812" y="30057092"/>
+            <a:ext cx="30723840" cy="4507228"/>
           </a:xfrm>
         </p:spPr>
         <p:txBody>
@@ -2482,39 +2482,39 @@
           <a:lstStyle>
             <a:lvl1pPr marL="0" indent="0">
               <a:buNone/>
-              <a:defRPr sz="6700"/>
+              <a:defRPr sz="7817"/>
             </a:lvl1pPr>
-            <a:lvl2pPr marL="2194560" indent="0">
-              <a:buNone/>
-              <a:defRPr sz="5800"/>
+            <a:lvl2pPr marL="2560393" indent="0">
+              <a:buNone/>
+              <a:defRPr sz="6767"/>
             </a:lvl2pPr>
-            <a:lvl3pPr marL="4389120" indent="0">
-              <a:buNone/>
-              <a:defRPr sz="4800"/>
+            <a:lvl3pPr marL="5120786" indent="0">
+              <a:buNone/>
+              <a:defRPr sz="5600"/>
             </a:lvl3pPr>
-            <a:lvl4pPr marL="6583680" indent="0">
-              <a:buNone/>
-              <a:defRPr sz="4300"/>
+            <a:lvl4pPr marL="7681179" indent="0">
+              <a:buNone/>
+              <a:defRPr sz="5017"/>
             </a:lvl4pPr>
-            <a:lvl5pPr marL="8778240" indent="0">
-              <a:buNone/>
-              <a:defRPr sz="4300"/>
+            <a:lvl5pPr marL="10241573" indent="0">
+              <a:buNone/>
+              <a:defRPr sz="5017"/>
             </a:lvl5pPr>
-            <a:lvl6pPr marL="10972800" indent="0">
-              <a:buNone/>
-              <a:defRPr sz="4300"/>
+            <a:lvl6pPr marL="12801966" indent="0">
+              <a:buNone/>
+              <a:defRPr sz="5017"/>
             </a:lvl6pPr>
-            <a:lvl7pPr marL="13167360" indent="0">
-              <a:buNone/>
-              <a:defRPr sz="4300"/>
+            <a:lvl7pPr marL="15362359" indent="0">
+              <a:buNone/>
+              <a:defRPr sz="5017"/>
             </a:lvl7pPr>
-            <a:lvl8pPr marL="15361920" indent="0">
-              <a:buNone/>
-              <a:defRPr sz="4300"/>
+            <a:lvl8pPr marL="17922752" indent="0">
+              <a:buNone/>
+              <a:defRPr sz="5017"/>
             </a:lvl8pPr>
-            <a:lvl9pPr marL="17556480" indent="0">
-              <a:buNone/>
-              <a:defRPr sz="4300"/>
+            <a:lvl9pPr marL="20483145" indent="0">
+              <a:buNone/>
+              <a:defRPr sz="5017"/>
             </a:lvl9pPr>
           </a:lstStyle>
           <a:p>
@@ -2544,7 +2544,7 @@
             <a:fld id="{35D5C8AE-1ECE-4A4A-8416-EADDD35C2323}" type="datetimeFigureOut">
               <a:rPr lang="en-US" smtClean="0"/>
               <a:pPr/>
-              <a:t>4/19/2014</a:t>
+              <a:t>4/21/2014</a:t>
             </a:fld>
             <a:endParaRPr lang="en-US"/>
           </a:p>
@@ -2640,8 +2640,8 @@
         </p:nvSpPr>
         <p:spPr>
           <a:xfrm>
-            <a:off x="2194560" y="1318262"/>
-            <a:ext cx="39502080" cy="5486400"/>
+            <a:off x="2560320" y="1537972"/>
+            <a:ext cx="46085760" cy="6400800"/>
           </a:xfrm>
           <a:prstGeom prst="rect">
             <a:avLst/>
@@ -2673,8 +2673,8 @@
         </p:nvSpPr>
         <p:spPr>
           <a:xfrm>
-            <a:off x="2194560" y="7680963"/>
-            <a:ext cx="39502080" cy="21724622"/>
+            <a:off x="2560320" y="8961124"/>
+            <a:ext cx="46085760" cy="25345392"/>
           </a:xfrm>
           <a:prstGeom prst="rect">
             <a:avLst/>
@@ -2735,8 +2735,8 @@
         </p:nvSpPr>
         <p:spPr>
           <a:xfrm>
-            <a:off x="2194560" y="30510482"/>
-            <a:ext cx="10241280" cy="1752600"/>
+            <a:off x="2560320" y="35595562"/>
+            <a:ext cx="11948160" cy="2044700"/>
           </a:xfrm>
           <a:prstGeom prst="rect">
             <a:avLst/>
@@ -2746,7 +2746,7 @@
           <a:bodyPr vert="horz" lIns="438912" tIns="219456" rIns="438912" bIns="219456" rtlCol="0" anchor="ctr"/>
           <a:lstStyle>
             <a:lvl1pPr algn="l">
-              <a:defRPr sz="5800">
+              <a:defRPr sz="6767">
                 <a:solidFill>
                   <a:schemeClr val="tx1">
                     <a:tint val="75000"/>
@@ -2759,7 +2759,7 @@
             <a:fld id="{35D5C8AE-1ECE-4A4A-8416-EADDD35C2323}" type="datetimeFigureOut">
               <a:rPr lang="en-US" smtClean="0"/>
               <a:pPr/>
-              <a:t>4/19/2014</a:t>
+              <a:t>4/21/2014</a:t>
             </a:fld>
             <a:endParaRPr lang="en-US"/>
           </a:p>
@@ -2777,8 +2777,8 @@
         </p:nvSpPr>
         <p:spPr>
           <a:xfrm>
-            <a:off x="14996160" y="30510482"/>
-            <a:ext cx="13898880" cy="1752600"/>
+            <a:off x="17495520" y="35595562"/>
+            <a:ext cx="16215360" cy="2044700"/>
           </a:xfrm>
           <a:prstGeom prst="rect">
             <a:avLst/>
@@ -2788,7 +2788,7 @@
           <a:bodyPr vert="horz" lIns="438912" tIns="219456" rIns="438912" bIns="219456" rtlCol="0" anchor="ctr"/>
           <a:lstStyle>
             <a:lvl1pPr algn="ctr">
-              <a:defRPr sz="5800">
+              <a:defRPr sz="6767">
                 <a:solidFill>
                   <a:schemeClr val="tx1">
                     <a:tint val="75000"/>
@@ -2814,8 +2814,8 @@
         </p:nvSpPr>
         <p:spPr>
           <a:xfrm>
-            <a:off x="31455360" y="30510482"/>
-            <a:ext cx="10241280" cy="1752600"/>
+            <a:off x="36697920" y="35595562"/>
+            <a:ext cx="11948160" cy="2044700"/>
           </a:xfrm>
           <a:prstGeom prst="rect">
             <a:avLst/>
@@ -2825,7 +2825,7 @@
           <a:bodyPr vert="horz" lIns="438912" tIns="219456" rIns="438912" bIns="219456" rtlCol="0" anchor="ctr"/>
           <a:lstStyle>
             <a:lvl1pPr algn="r">
-              <a:defRPr sz="5800">
+              <a:defRPr sz="6767">
                 <a:solidFill>
                   <a:schemeClr val="tx1">
                     <a:tint val="75000"/>
@@ -2867,12 +2867,12 @@
   </p:sldLayoutIdLst>
   <p:txStyles>
     <p:titleStyle>
-      <a:lvl1pPr algn="ctr" defTabSz="4389120" rtl="0" eaLnBrk="1" latinLnBrk="0" hangingPunct="1">
+      <a:lvl1pPr algn="ctr" defTabSz="5120786" rtl="0" eaLnBrk="1" latinLnBrk="0" hangingPunct="1">
         <a:spcBef>
           <a:spcPct val="0"/>
         </a:spcBef>
         <a:buNone/>
-        <a:defRPr sz="21100" kern="1200">
+        <a:defRPr sz="24617" kern="1200">
           <a:solidFill>
             <a:schemeClr val="tx1"/>
           </a:solidFill>
@@ -2883,13 +2883,13 @@
       </a:lvl1pPr>
     </p:titleStyle>
     <p:bodyStyle>
-      <a:lvl1pPr marL="1645920" indent="-1645920" algn="l" defTabSz="4389120" rtl="0" eaLnBrk="1" latinLnBrk="0" hangingPunct="1">
+      <a:lvl1pPr marL="1920295" indent="-1920295" algn="l" defTabSz="5120786" rtl="0" eaLnBrk="1" latinLnBrk="0" hangingPunct="1">
         <a:spcBef>
           <a:spcPct val="20000"/>
         </a:spcBef>
         <a:buFont typeface="Arial" pitchFamily="34" charset="0"/>
         <a:buChar char="•"/>
-        <a:defRPr sz="15400" kern="1200">
+        <a:defRPr sz="17967" kern="1200">
           <a:solidFill>
             <a:schemeClr val="tx1"/>
           </a:solidFill>
@@ -2898,13 +2898,13 @@
           <a:cs typeface="+mn-cs"/>
         </a:defRPr>
       </a:lvl1pPr>
-      <a:lvl2pPr marL="3566160" indent="-1371600" algn="l" defTabSz="4389120" rtl="0" eaLnBrk="1" latinLnBrk="0" hangingPunct="1">
+      <a:lvl2pPr marL="4160639" indent="-1600246" algn="l" defTabSz="5120786" rtl="0" eaLnBrk="1" latinLnBrk="0" hangingPunct="1">
         <a:spcBef>
           <a:spcPct val="20000"/>
         </a:spcBef>
         <a:buFont typeface="Arial" pitchFamily="34" charset="0"/>
         <a:buChar char="–"/>
-        <a:defRPr sz="13400" kern="1200">
+        <a:defRPr sz="15634" kern="1200">
           <a:solidFill>
             <a:schemeClr val="tx1"/>
           </a:solidFill>
@@ -2913,13 +2913,13 @@
           <a:cs typeface="+mn-cs"/>
         </a:defRPr>
       </a:lvl2pPr>
-      <a:lvl3pPr marL="5486400" indent="-1097280" algn="l" defTabSz="4389120" rtl="0" eaLnBrk="1" latinLnBrk="0" hangingPunct="1">
+      <a:lvl3pPr marL="6400983" indent="-1280197" algn="l" defTabSz="5120786" rtl="0" eaLnBrk="1" latinLnBrk="0" hangingPunct="1">
         <a:spcBef>
           <a:spcPct val="20000"/>
         </a:spcBef>
         <a:buFont typeface="Arial" pitchFamily="34" charset="0"/>
         <a:buChar char="•"/>
-        <a:defRPr sz="11500" kern="1200">
+        <a:defRPr sz="13417" kern="1200">
           <a:solidFill>
             <a:schemeClr val="tx1"/>
           </a:solidFill>
@@ -2928,13 +2928,13 @@
           <a:cs typeface="+mn-cs"/>
         </a:defRPr>
       </a:lvl3pPr>
-      <a:lvl4pPr marL="7680960" indent="-1097280" algn="l" defTabSz="4389120" rtl="0" eaLnBrk="1" latinLnBrk="0" hangingPunct="1">
+      <a:lvl4pPr marL="8961376" indent="-1280197" algn="l" defTabSz="5120786" rtl="0" eaLnBrk="1" latinLnBrk="0" hangingPunct="1">
         <a:spcBef>
           <a:spcPct val="20000"/>
         </a:spcBef>
         <a:buFont typeface="Arial" pitchFamily="34" charset="0"/>
         <a:buChar char="–"/>
-        <a:defRPr sz="9600" kern="1200">
+        <a:defRPr sz="11200" kern="1200">
           <a:solidFill>
             <a:schemeClr val="tx1"/>
           </a:solidFill>
@@ -2943,13 +2943,13 @@
           <a:cs typeface="+mn-cs"/>
         </a:defRPr>
       </a:lvl4pPr>
-      <a:lvl5pPr marL="9875520" indent="-1097280" algn="l" defTabSz="4389120" rtl="0" eaLnBrk="1" latinLnBrk="0" hangingPunct="1">
+      <a:lvl5pPr marL="11521769" indent="-1280197" algn="l" defTabSz="5120786" rtl="0" eaLnBrk="1" latinLnBrk="0" hangingPunct="1">
         <a:spcBef>
           <a:spcPct val="20000"/>
         </a:spcBef>
         <a:buFont typeface="Arial" pitchFamily="34" charset="0"/>
         <a:buChar char="»"/>
-        <a:defRPr sz="9600" kern="1200">
+        <a:defRPr sz="11200" kern="1200">
           <a:solidFill>
             <a:schemeClr val="tx1"/>
           </a:solidFill>
@@ -2958,13 +2958,13 @@
           <a:cs typeface="+mn-cs"/>
         </a:defRPr>
       </a:lvl5pPr>
-      <a:lvl6pPr marL="12070080" indent="-1097280" algn="l" defTabSz="4389120" rtl="0" eaLnBrk="1" latinLnBrk="0" hangingPunct="1">
+      <a:lvl6pPr marL="14082162" indent="-1280197" algn="l" defTabSz="5120786" rtl="0" eaLnBrk="1" latinLnBrk="0" hangingPunct="1">
         <a:spcBef>
           <a:spcPct val="20000"/>
         </a:spcBef>
         <a:buFont typeface="Arial" pitchFamily="34" charset="0"/>
         <a:buChar char="•"/>
-        <a:defRPr sz="9600" kern="1200">
+        <a:defRPr sz="11200" kern="1200">
           <a:solidFill>
             <a:schemeClr val="tx1"/>
           </a:solidFill>
@@ -2973,13 +2973,13 @@
           <a:cs typeface="+mn-cs"/>
         </a:defRPr>
       </a:lvl6pPr>
-      <a:lvl7pPr marL="14264640" indent="-1097280" algn="l" defTabSz="4389120" rtl="0" eaLnBrk="1" latinLnBrk="0" hangingPunct="1">
+      <a:lvl7pPr marL="16642555" indent="-1280197" algn="l" defTabSz="5120786" rtl="0" eaLnBrk="1" latinLnBrk="0" hangingPunct="1">
         <a:spcBef>
           <a:spcPct val="20000"/>
         </a:spcBef>
         <a:buFont typeface="Arial" pitchFamily="34" charset="0"/>
         <a:buChar char="•"/>
-        <a:defRPr sz="9600" kern="1200">
+        <a:defRPr sz="11200" kern="1200">
           <a:solidFill>
             <a:schemeClr val="tx1"/>
           </a:solidFill>
@@ -2988,13 +2988,13 @@
           <a:cs typeface="+mn-cs"/>
         </a:defRPr>
       </a:lvl7pPr>
-      <a:lvl8pPr marL="16459200" indent="-1097280" algn="l" defTabSz="4389120" rtl="0" eaLnBrk="1" latinLnBrk="0" hangingPunct="1">
+      <a:lvl8pPr marL="19202949" indent="-1280197" algn="l" defTabSz="5120786" rtl="0" eaLnBrk="1" latinLnBrk="0" hangingPunct="1">
         <a:spcBef>
           <a:spcPct val="20000"/>
         </a:spcBef>
         <a:buFont typeface="Arial" pitchFamily="34" charset="0"/>
         <a:buChar char="•"/>
-        <a:defRPr sz="9600" kern="1200">
+        <a:defRPr sz="11200" kern="1200">
           <a:solidFill>
             <a:schemeClr val="tx1"/>
           </a:solidFill>
@@ -3003,13 +3003,13 @@
           <a:cs typeface="+mn-cs"/>
         </a:defRPr>
       </a:lvl8pPr>
-      <a:lvl9pPr marL="18653760" indent="-1097280" algn="l" defTabSz="4389120" rtl="0" eaLnBrk="1" latinLnBrk="0" hangingPunct="1">
+      <a:lvl9pPr marL="21763342" indent="-1280197" algn="l" defTabSz="5120786" rtl="0" eaLnBrk="1" latinLnBrk="0" hangingPunct="1">
         <a:spcBef>
           <a:spcPct val="20000"/>
         </a:spcBef>
         <a:buFont typeface="Arial" pitchFamily="34" charset="0"/>
         <a:buChar char="•"/>
-        <a:defRPr sz="9600" kern="1200">
+        <a:defRPr sz="11200" kern="1200">
           <a:solidFill>
             <a:schemeClr val="tx1"/>
           </a:solidFill>
@@ -3023,8 +3023,8 @@
       <a:defPPr>
         <a:defRPr lang="en-US"/>
       </a:defPPr>
-      <a:lvl1pPr marL="0" algn="l" defTabSz="4389120" rtl="0" eaLnBrk="1" latinLnBrk="0" hangingPunct="1">
-        <a:defRPr sz="8600" kern="1200">
+      <a:lvl1pPr marL="0" algn="l" defTabSz="5120786" rtl="0" eaLnBrk="1" latinLnBrk="0" hangingPunct="1">
+        <a:defRPr sz="10034" kern="1200">
           <a:solidFill>
             <a:schemeClr val="tx1"/>
           </a:solidFill>
@@ -3033,8 +3033,8 @@
           <a:cs typeface="+mn-cs"/>
         </a:defRPr>
       </a:lvl1pPr>
-      <a:lvl2pPr marL="2194560" algn="l" defTabSz="4389120" rtl="0" eaLnBrk="1" latinLnBrk="0" hangingPunct="1">
-        <a:defRPr sz="8600" kern="1200">
+      <a:lvl2pPr marL="2560393" algn="l" defTabSz="5120786" rtl="0" eaLnBrk="1" latinLnBrk="0" hangingPunct="1">
+        <a:defRPr sz="10034" kern="1200">
           <a:solidFill>
             <a:schemeClr val="tx1"/>
           </a:solidFill>
@@ -3043,8 +3043,8 @@
           <a:cs typeface="+mn-cs"/>
         </a:defRPr>
       </a:lvl2pPr>
-      <a:lvl3pPr marL="4389120" algn="l" defTabSz="4389120" rtl="0" eaLnBrk="1" latinLnBrk="0" hangingPunct="1">
-        <a:defRPr sz="8600" kern="1200">
+      <a:lvl3pPr marL="5120786" algn="l" defTabSz="5120786" rtl="0" eaLnBrk="1" latinLnBrk="0" hangingPunct="1">
+        <a:defRPr sz="10034" kern="1200">
           <a:solidFill>
             <a:schemeClr val="tx1"/>
           </a:solidFill>
@@ -3053,8 +3053,8 @@
           <a:cs typeface="+mn-cs"/>
         </a:defRPr>
       </a:lvl3pPr>
-      <a:lvl4pPr marL="6583680" algn="l" defTabSz="4389120" rtl="0" eaLnBrk="1" latinLnBrk="0" hangingPunct="1">
-        <a:defRPr sz="8600" kern="1200">
+      <a:lvl4pPr marL="7681179" algn="l" defTabSz="5120786" rtl="0" eaLnBrk="1" latinLnBrk="0" hangingPunct="1">
+        <a:defRPr sz="10034" kern="1200">
           <a:solidFill>
             <a:schemeClr val="tx1"/>
           </a:solidFill>
@@ -3063,8 +3063,8 @@
           <a:cs typeface="+mn-cs"/>
         </a:defRPr>
       </a:lvl4pPr>
-      <a:lvl5pPr marL="8778240" algn="l" defTabSz="4389120" rtl="0" eaLnBrk="1" latinLnBrk="0" hangingPunct="1">
-        <a:defRPr sz="8600" kern="1200">
+      <a:lvl5pPr marL="10241573" algn="l" defTabSz="5120786" rtl="0" eaLnBrk="1" latinLnBrk="0" hangingPunct="1">
+        <a:defRPr sz="10034" kern="1200">
           <a:solidFill>
             <a:schemeClr val="tx1"/>
           </a:solidFill>
@@ -3073,8 +3073,8 @@
           <a:cs typeface="+mn-cs"/>
         </a:defRPr>
       </a:lvl5pPr>
-      <a:lvl6pPr marL="10972800" algn="l" defTabSz="4389120" rtl="0" eaLnBrk="1" latinLnBrk="0" hangingPunct="1">
-        <a:defRPr sz="8600" kern="1200">
+      <a:lvl6pPr marL="12801966" algn="l" defTabSz="5120786" rtl="0" eaLnBrk="1" latinLnBrk="0" hangingPunct="1">
+        <a:defRPr sz="10034" kern="1200">
           <a:solidFill>
             <a:schemeClr val="tx1"/>
           </a:solidFill>
@@ -3083,8 +3083,8 @@
           <a:cs typeface="+mn-cs"/>
         </a:defRPr>
       </a:lvl6pPr>
-      <a:lvl7pPr marL="13167360" algn="l" defTabSz="4389120" rtl="0" eaLnBrk="1" latinLnBrk="0" hangingPunct="1">
-        <a:defRPr sz="8600" kern="1200">
+      <a:lvl7pPr marL="15362359" algn="l" defTabSz="5120786" rtl="0" eaLnBrk="1" latinLnBrk="0" hangingPunct="1">
+        <a:defRPr sz="10034" kern="1200">
           <a:solidFill>
             <a:schemeClr val="tx1"/>
           </a:solidFill>
@@ -3093,8 +3093,8 @@
           <a:cs typeface="+mn-cs"/>
         </a:defRPr>
       </a:lvl7pPr>
-      <a:lvl8pPr marL="15361920" algn="l" defTabSz="4389120" rtl="0" eaLnBrk="1" latinLnBrk="0" hangingPunct="1">
-        <a:defRPr sz="8600" kern="1200">
+      <a:lvl8pPr marL="17922752" algn="l" defTabSz="5120786" rtl="0" eaLnBrk="1" latinLnBrk="0" hangingPunct="1">
+        <a:defRPr sz="10034" kern="1200">
           <a:solidFill>
             <a:schemeClr val="tx1"/>
           </a:solidFill>
@@ -3103,8 +3103,8 @@
           <a:cs typeface="+mn-cs"/>
         </a:defRPr>
       </a:lvl8pPr>
-      <a:lvl9pPr marL="17556480" algn="l" defTabSz="4389120" rtl="0" eaLnBrk="1" latinLnBrk="0" hangingPunct="1">
-        <a:defRPr sz="8600" kern="1200">
+      <a:lvl9pPr marL="20483145" algn="l" defTabSz="5120786" rtl="0" eaLnBrk="1" latinLnBrk="0" hangingPunct="1">
+        <a:defRPr sz="10034" kern="1200">
           <a:solidFill>
             <a:schemeClr val="tx1"/>
           </a:solidFill>
@@ -3143,8 +3143,8 @@
         </p:nvSpPr>
         <p:spPr>
           <a:xfrm>
-            <a:off x="457200" y="4310322"/>
-            <a:ext cx="42900600" cy="28150878"/>
+            <a:off x="533400" y="5028709"/>
+            <a:ext cx="50050700" cy="32842691"/>
           </a:xfrm>
           <a:prstGeom prst="rect">
             <a:avLst/>
@@ -3179,7 +3179,7 @@
           <a:lstStyle/>
           <a:p>
             <a:pPr algn="ctr"/>
-            <a:endParaRPr lang="en-US"/>
+            <a:endParaRPr lang="en-US" sz="11706"/>
           </a:p>
         </p:txBody>
       </p:sp>
@@ -3191,8 +3191,8 @@
         </p:nvSpPr>
         <p:spPr>
           <a:xfrm>
-            <a:off x="802606" y="4694835"/>
-            <a:ext cx="13716000" cy="27381851"/>
+            <a:off x="936374" y="5477308"/>
+            <a:ext cx="16002000" cy="31945493"/>
           </a:xfrm>
           <a:prstGeom prst="rect">
             <a:avLst/>
@@ -3222,34 +3222,23 @@
           <a:lstStyle/>
           <a:p>
             <a:pPr algn="ctr"/>
-            <a:endParaRPr lang="en-US" dirty="0"/>
+            <a:endParaRPr lang="en-US" sz="11706" dirty="0"/>
           </a:p>
         </p:txBody>
       </p:sp>
       <p:grpSp>
         <p:nvGrpSpPr>
-          <p:cNvPr id="26" name="Group 25"/>
+          <p:cNvPr id="10" name="Group 9"/>
           <p:cNvGrpSpPr/>
           <p:nvPr/>
         </p:nvGrpSpPr>
         <p:grpSpPr>
           <a:xfrm>
-            <a:off x="8676272" y="609600"/>
-            <a:ext cx="26631900" cy="3366590"/>
-            <a:chOff x="8877300" y="1718028"/>
-            <a:chExt cx="26631900" cy="3366590"/>
+            <a:off x="10130101" y="460961"/>
+            <a:ext cx="31070551" cy="4048352"/>
+            <a:chOff x="10122317" y="650868"/>
+            <a:chExt cx="31070551" cy="4048352"/>
           </a:xfrm>
-          <a:gradFill>
-            <a:gsLst>
-              <a:gs pos="0">
-                <a:srgbClr val="5E9EFF"/>
-              </a:gs>
-              <a:gs pos="39999">
-                <a:srgbClr val="85C2FF"/>
-              </a:gs>
-            </a:gsLst>
-            <a:lin ang="5400000" scaled="0"/>
-          </a:gradFill>
         </p:grpSpPr>
         <p:sp>
           <p:nvSpPr>
@@ -3259,13 +3248,23 @@
           </p:nvSpPr>
           <p:spPr>
             <a:xfrm>
-              <a:off x="8877300" y="1718028"/>
-              <a:ext cx="26631900" cy="3366590"/>
+              <a:off x="10122317" y="711200"/>
+              <a:ext cx="31070550" cy="3927688"/>
             </a:xfrm>
             <a:prstGeom prst="roundRect">
               <a:avLst/>
             </a:prstGeom>
-            <a:grpFill/>
+            <a:gradFill>
+              <a:gsLst>
+                <a:gs pos="0">
+                  <a:srgbClr val="5E9EFF"/>
+                </a:gs>
+                <a:gs pos="39999">
+                  <a:srgbClr val="85C2FF"/>
+                </a:gs>
+              </a:gsLst>
+              <a:lin ang="5400000" scaled="0"/>
+            </a:gradFill>
             <a:ln>
               <a:noFill/>
             </a:ln>
@@ -3291,7 +3290,7 @@
             <a:lstStyle/>
             <a:p>
               <a:pPr algn="ctr"/>
-              <a:endParaRPr lang="en-US"/>
+              <a:endParaRPr lang="en-US" sz="11706"/>
             </a:p>
           </p:txBody>
         </p:sp>
@@ -3303,52 +3302,47 @@
           </p:nvSpPr>
           <p:spPr>
             <a:xfrm>
-              <a:off x="9734550" y="1718028"/>
-              <a:ext cx="24555450" cy="3262432"/>
+              <a:off x="10122318" y="650868"/>
+              <a:ext cx="31070550" cy="4048352"/>
             </a:xfrm>
             <a:prstGeom prst="rect">
               <a:avLst/>
             </a:prstGeom>
-            <a:grpFill/>
+            <a:noFill/>
             <a:ln>
               <a:noFill/>
             </a:ln>
           </p:spPr>
           <p:txBody>
-            <a:bodyPr wrap="square" rtlCol="0">
+            <a:bodyPr wrap="square" lIns="0" tIns="0" rIns="0" bIns="0" rtlCol="0" anchor="ctr" anchorCtr="1">
               <a:spAutoFit/>
             </a:bodyPr>
             <a:lstStyle/>
             <a:p>
               <a:pPr algn="ctr"/>
               <a:r>
-                <a:rPr lang="en-US" b="1" dirty="0" smtClean="0"/>
+                <a:rPr lang="en-US" sz="11706" b="1" dirty="0"/>
                 <a:t>Robotic Doorman Project</a:t>
               </a:r>
             </a:p>
             <a:p>
               <a:pPr algn="ctr"/>
               <a:r>
-                <a:rPr lang="en-US" sz="4000" dirty="0" smtClean="0"/>
-                <a:t>Team: Adam Hall</a:t>
+                <a:rPr lang="en-US" sz="4667" dirty="0"/>
+                <a:t>Team: Adam Hall, Jasper Yu, Peter Wins</a:t>
               </a:r>
-              <a:r>
-                <a:rPr lang="en-US" sz="4000" smtClean="0"/>
-                <a:t>, Jasper Yu, Peter Wins</a:t>
-              </a:r>
-              <a:endParaRPr lang="en-US" sz="4000" dirty="0" smtClean="0"/>
             </a:p>
             <a:p>
               <a:pPr algn="ctr"/>
               <a:r>
-                <a:rPr lang="en-US" sz="4000" dirty="0" smtClean="0"/>
+                <a:rPr lang="en-US" sz="4667" dirty="0"/>
                 <a:t>Mentors: Dr. Kyle Johnsen, Dr. Peter Kner</a:t>
               </a:r>
             </a:p>
             <a:p>
               <a:pPr algn="ctr"/>
               <a:r>
-                <a:rPr lang="en-US" sz="4000" dirty="0" smtClean="0"/>
+                <a:rPr lang="en-US" sz="4667" dirty="0"/>
                 <a:t>Driftmier Engineering Center, Athens, GA 30602</a:t>
               </a:r>
             </a:p>
@@ -3363,8 +3357,8 @@
         </p:nvSpPr>
         <p:spPr>
           <a:xfrm>
-            <a:off x="1607764" y="6919830"/>
-            <a:ext cx="11803436" cy="11172289"/>
+            <a:off x="936373" y="8073135"/>
+            <a:ext cx="16002002" cy="13018949"/>
           </a:xfrm>
           <a:prstGeom prst="rect">
             <a:avLst/>
@@ -3372,191 +3366,71 @@
           <a:noFill/>
         </p:spPr>
         <p:txBody>
-          <a:bodyPr wrap="square" rtlCol="0">
+          <a:bodyPr wrap="square" lIns="850392" rIns="850392" rtlCol="0">
             <a:spAutoFit/>
           </a:bodyPr>
           <a:lstStyle/>
           <a:p>
             <a:r>
-              <a:rPr lang="en-US" sz="3600" dirty="0" smtClean="0"/>
-              <a:t>     Our </a:t>
-            </a:r>
-            <a:r>
-              <a:rPr lang="en-US" sz="3600" dirty="0"/>
-              <a:t>group has been tasked with creating an automated classroom access solution which attempts to strike a balance between convenience, security, and accountability for UGA students, faculty, and the University system. </a:t>
-            </a:r>
-            <a:r>
-              <a:rPr lang="en-US" sz="3600" dirty="0" smtClean="0"/>
-              <a:t>Our access </a:t>
-            </a:r>
-            <a:r>
-              <a:rPr lang="en-US" sz="3600" dirty="0"/>
-              <a:t>solution </a:t>
-            </a:r>
-            <a:r>
-              <a:rPr lang="en-US" sz="3600" dirty="0" smtClean="0"/>
-              <a:t>will be refined </a:t>
-            </a:r>
-            <a:r>
-              <a:rPr lang="en-US" sz="3600" dirty="0"/>
-              <a:t>to meet the </a:t>
-            </a:r>
-            <a:r>
-              <a:rPr lang="en-US" sz="3600" dirty="0" smtClean="0"/>
-              <a:t>needs </a:t>
-            </a:r>
-            <a:r>
-              <a:rPr lang="en-US" sz="3600" dirty="0"/>
-              <a:t>of our stakeholders</a:t>
-            </a:r>
-            <a:r>
-              <a:rPr lang="en-US" sz="3600" dirty="0" smtClean="0"/>
-              <a:t>:</a:t>
-            </a:r>
-            <a:endParaRPr lang="en-US" sz="3600" dirty="0"/>
-          </a:p>
-          <a:p>
-            <a:pPr marL="571500" indent="-571500">
+              <a:rPr lang="en-US" sz="4200" dirty="0"/>
+              <a:t>     Our group has been tasked with creating an automated classroom access solution which attempts to strike a balance between convenience, security, and accountability for UGA students, faculty, and the University system. Our access solution will be refined to meet the needs of our stakeholders:</a:t>
+            </a:r>
+          </a:p>
+          <a:p>
+            <a:pPr marL="666769" indent="-666769">
               <a:buFont typeface="Arial" panose="020B0604020202020204" pitchFamily="34" charset="0"/>
               <a:buChar char="•"/>
             </a:pPr>
             <a:r>
-              <a:rPr lang="en-US" sz="3600" dirty="0" smtClean="0"/>
-              <a:t>Students </a:t>
-            </a:r>
-            <a:r>
-              <a:rPr lang="en-US" sz="3600" dirty="0"/>
-              <a:t>need access to classroom and lab spaces in a convenient and efficient manner to complete </a:t>
-            </a:r>
-            <a:r>
-              <a:rPr lang="en-US" sz="3600" dirty="0" smtClean="0"/>
-              <a:t>work;</a:t>
-            </a:r>
-            <a:endParaRPr lang="en-US" sz="3600" dirty="0"/>
-          </a:p>
-          <a:p>
-            <a:pPr marL="571500" indent="-571500">
+              <a:rPr lang="en-US" sz="4200" dirty="0"/>
+              <a:t>Students need access to classroom and lab spaces in a convenient and efficient manner to complete work;</a:t>
+            </a:r>
+          </a:p>
+          <a:p>
+            <a:pPr marL="666769" indent="-666769">
               <a:buFont typeface="Arial" panose="020B0604020202020204" pitchFamily="34" charset="0"/>
               <a:buChar char="•"/>
             </a:pPr>
             <a:r>
-              <a:rPr lang="en-US" sz="3600" dirty="0"/>
-              <a:t>F</a:t>
-            </a:r>
-            <a:r>
-              <a:rPr lang="en-US" sz="3600" dirty="0" smtClean="0"/>
-              <a:t>aculty </a:t>
-            </a:r>
-            <a:r>
-              <a:rPr lang="en-US" sz="3600" dirty="0"/>
-              <a:t>need to monitor and control access to classrooms and lab spaces to protect equipment and projects which can be difficult or impossible to replace;</a:t>
-            </a:r>
-          </a:p>
-          <a:p>
-            <a:pPr marL="571500" indent="-571500">
+              <a:rPr lang="en-US" sz="4200" dirty="0"/>
+              <a:t>Faculty need to monitor and control access to classrooms and lab spaces to protect equipment and projects which can be difficult or impossible to replace;</a:t>
+            </a:r>
+          </a:p>
+          <a:p>
+            <a:pPr marL="666769" indent="-666769">
               <a:buFont typeface="Arial" panose="020B0604020202020204" pitchFamily="34" charset="0"/>
               <a:buChar char="•"/>
             </a:pPr>
             <a:r>
-              <a:rPr lang="en-US" sz="3600" dirty="0"/>
-              <a:t>T</a:t>
-            </a:r>
-            <a:r>
-              <a:rPr lang="en-US" sz="3600" dirty="0" smtClean="0"/>
-              <a:t>he </a:t>
-            </a:r>
-            <a:r>
-              <a:rPr lang="en-US" sz="3600" dirty="0"/>
-              <a:t>University system demands accountability to protect its assets and ensure the well-being of its students and faculty</a:t>
-            </a:r>
-            <a:r>
-              <a:rPr lang="en-US" sz="3600" dirty="0" smtClean="0"/>
-              <a:t>.</a:t>
-            </a:r>
-            <a:endParaRPr lang="en-US" sz="3600" dirty="0"/>
-          </a:p>
-          <a:p>
-            <a:r>
-              <a:rPr lang="en-US" sz="3600" dirty="0" smtClean="0"/>
-              <a:t>Currently, </a:t>
-            </a:r>
-            <a:r>
-              <a:rPr lang="en-US" sz="3600" dirty="0"/>
-              <a:t>the best solution to the problem of convenient access is to create </a:t>
-            </a:r>
-            <a:r>
-              <a:rPr lang="en-US" sz="3600" dirty="0" smtClean="0"/>
-              <a:t>door keys </a:t>
-            </a:r>
-            <a:r>
-              <a:rPr lang="en-US" sz="3600" dirty="0"/>
-              <a:t>for the students who need them. </a:t>
-            </a:r>
-            <a:r>
-              <a:rPr lang="en-US" sz="3600" dirty="0" smtClean="0"/>
-              <a:t>This solution allows </a:t>
-            </a:r>
-            <a:r>
-              <a:rPr lang="en-US" sz="3600" dirty="0"/>
-              <a:t>for the possibility of lost or stolen keys, which results in the opposite of what </a:t>
-            </a:r>
-            <a:r>
-              <a:rPr lang="en-US" sz="3600" dirty="0" smtClean="0"/>
-              <a:t>our shareholders desire </a:t>
-            </a:r>
-            <a:r>
-              <a:rPr lang="en-US" sz="3600" dirty="0"/>
-              <a:t>in an access </a:t>
-            </a:r>
-            <a:r>
-              <a:rPr lang="en-US" sz="3600" dirty="0" smtClean="0"/>
-              <a:t>solution. Our solution will provide secure access to students and faculty at any time of day. By standardizing facility access, student </a:t>
-            </a:r>
-            <a:r>
-              <a:rPr lang="en-US" sz="3600" dirty="0"/>
-              <a:t>access </a:t>
-            </a:r>
-            <a:r>
-              <a:rPr lang="en-US" sz="3600" dirty="0" smtClean="0"/>
-              <a:t>will be on-demand, faculty can control room access, and the University will save money.</a:t>
+              <a:rPr lang="en-US" sz="4200" dirty="0"/>
+              <a:t>The University system demands accountability to protect its assets and ensure the well-being of its students and faculty.</a:t>
+            </a:r>
+          </a:p>
+          <a:p>
+            <a:r>
+              <a:rPr lang="en-US" sz="4200" dirty="0" smtClean="0"/>
+              <a:t>Currently</a:t>
+            </a:r>
+            <a:r>
+              <a:rPr lang="en-US" sz="4200" dirty="0"/>
+              <a:t>, the best solution to the problem of convenient access is to create door keys for the students who need them. This solution allows for the possibility of lost or stolen keys, which results in the opposite of what our shareholders desire in an access solution. Our solution will provide secure access to students and faculty at any time of day. By standardizing facility access, student access will be on-demand, faculty can control room access, and the University will save money.</a:t>
             </a:r>
           </a:p>
         </p:txBody>
       </p:sp>
       <p:grpSp>
         <p:nvGrpSpPr>
-          <p:cNvPr id="38" name="Group 37"/>
+          <p:cNvPr id="5" name="Group 4"/>
           <p:cNvGrpSpPr/>
           <p:nvPr/>
         </p:nvGrpSpPr>
         <p:grpSpPr>
           <a:xfrm>
-            <a:off x="3636940" y="5029199"/>
-            <a:ext cx="7745084" cy="1702489"/>
-            <a:chOff x="8877300" y="1718028"/>
-            <a:chExt cx="26631900" cy="3366590"/>
+            <a:off x="4419407" y="5867399"/>
+            <a:ext cx="9035931" cy="1986237"/>
+            <a:chOff x="4243097" y="5867400"/>
+            <a:chExt cx="9035931" cy="1986237"/>
           </a:xfrm>
-          <a:gradFill>
-            <a:gsLst>
-              <a:gs pos="50000">
-                <a:srgbClr val="FF0300">
-                  <a:lumMod val="40000"/>
-                  <a:lumOff val="60000"/>
-                </a:srgbClr>
-              </a:gs>
-              <a:gs pos="20000">
-                <a:srgbClr val="FF0000">
-                  <a:lumMod val="91000"/>
-                </a:srgbClr>
-              </a:gs>
-              <a:gs pos="82000">
-                <a:srgbClr val="FF0000">
-                  <a:lumMod val="91000"/>
-                </a:srgbClr>
-              </a:gs>
-            </a:gsLst>
-            <a:lin ang="10800000" scaled="0"/>
-          </a:gradFill>
         </p:grpSpPr>
         <p:sp>
           <p:nvSpPr>
@@ -3566,8 +3440,8 @@
           </p:nvSpPr>
           <p:spPr>
             <a:xfrm>
-              <a:off x="8877300" y="1718028"/>
-              <a:ext cx="26631900" cy="3366590"/>
+              <a:off x="4243097" y="5867400"/>
+              <a:ext cx="9035931" cy="1986237"/>
             </a:xfrm>
             <a:prstGeom prst="roundRect">
               <a:avLst/>
@@ -3605,7 +3479,7 @@
             <a:lstStyle/>
             <a:p>
               <a:pPr algn="ctr"/>
-              <a:endParaRPr lang="en-US"/>
+              <a:endParaRPr lang="en-US" sz="11706"/>
             </a:p>
           </p:txBody>
         </p:sp>
@@ -3617,8 +3491,8 @@
           </p:nvSpPr>
           <p:spPr>
             <a:xfrm>
-              <a:off x="8877303" y="2260485"/>
-              <a:ext cx="26631897" cy="1808182"/>
+              <a:off x="4243098" y="6187441"/>
+              <a:ext cx="9035930" cy="1384995"/>
             </a:xfrm>
             <a:prstGeom prst="rect">
               <a:avLst/>
@@ -3633,7 +3507,7 @@
             <a:p>
               <a:pPr algn="ctr"/>
               <a:r>
-                <a:rPr lang="en-US" sz="7200" dirty="0" smtClean="0"/>
+                <a:rPr lang="en-US" sz="8400" dirty="0"/>
                 <a:t>Problem Statement</a:t>
               </a:r>
             </a:p>
@@ -3648,8 +3522,8 @@
         </p:nvSpPr>
         <p:spPr>
           <a:xfrm>
-            <a:off x="14996611" y="4648200"/>
-            <a:ext cx="13991222" cy="27381851"/>
+            <a:off x="17496046" y="5477308"/>
+            <a:ext cx="16323092" cy="31891086"/>
           </a:xfrm>
           <a:prstGeom prst="rect">
             <a:avLst/>
@@ -3679,7 +3553,7 @@
           <a:lstStyle/>
           <a:p>
             <a:pPr algn="ctr"/>
-            <a:endParaRPr lang="en-US" dirty="0"/>
+            <a:endParaRPr lang="en-US" sz="11706" dirty="0"/>
           </a:p>
         </p:txBody>
       </p:sp>
@@ -3691,8 +3565,8 @@
         </p:nvSpPr>
         <p:spPr>
           <a:xfrm>
-            <a:off x="29260802" y="4679110"/>
-            <a:ext cx="13716000" cy="27381851"/>
+            <a:off x="34137602" y="5477308"/>
+            <a:ext cx="16002000" cy="31927147"/>
           </a:xfrm>
           <a:prstGeom prst="rect">
             <a:avLst/>
@@ -3722,44 +3596,23 @@
           <a:lstStyle/>
           <a:p>
             <a:pPr algn="ctr"/>
-            <a:endParaRPr lang="en-US"/>
+            <a:endParaRPr lang="en-US" sz="11706"/>
           </a:p>
         </p:txBody>
       </p:sp>
       <p:grpSp>
         <p:nvGrpSpPr>
-          <p:cNvPr id="52" name="Group 51"/>
+          <p:cNvPr id="4" name="Group 3"/>
           <p:cNvGrpSpPr/>
           <p:nvPr/>
         </p:nvGrpSpPr>
         <p:grpSpPr>
           <a:xfrm>
-            <a:off x="18119680" y="5029198"/>
-            <a:ext cx="7745084" cy="1702489"/>
-            <a:chOff x="8877300" y="1718028"/>
-            <a:chExt cx="26631900" cy="3366590"/>
+            <a:off x="21040784" y="5867399"/>
+            <a:ext cx="9035931" cy="1986237"/>
+            <a:chOff x="21139627" y="5867398"/>
+            <a:chExt cx="9035931" cy="1986237"/>
           </a:xfrm>
-          <a:gradFill>
-            <a:gsLst>
-              <a:gs pos="50000">
-                <a:srgbClr val="FF0300">
-                  <a:lumMod val="40000"/>
-                  <a:lumOff val="60000"/>
-                </a:srgbClr>
-              </a:gs>
-              <a:gs pos="20000">
-                <a:srgbClr val="FF0000">
-                  <a:lumMod val="91000"/>
-                </a:srgbClr>
-              </a:gs>
-              <a:gs pos="82000">
-                <a:srgbClr val="FF0000">
-                  <a:lumMod val="91000"/>
-                </a:srgbClr>
-              </a:gs>
-            </a:gsLst>
-            <a:lin ang="10800000" scaled="0"/>
-          </a:gradFill>
         </p:grpSpPr>
         <p:sp>
           <p:nvSpPr>
@@ -3769,8 +3622,8 @@
           </p:nvSpPr>
           <p:spPr>
             <a:xfrm>
-              <a:off x="8877300" y="1718028"/>
-              <a:ext cx="26631900" cy="3366590"/>
+              <a:off x="21139627" y="5867398"/>
+              <a:ext cx="9035931" cy="1986237"/>
             </a:xfrm>
             <a:prstGeom prst="roundRect">
               <a:avLst/>
@@ -3808,7 +3661,7 @@
             <a:lstStyle/>
             <a:p>
               <a:pPr algn="ctr"/>
-              <a:endParaRPr lang="en-US"/>
+              <a:endParaRPr lang="en-US" sz="11706"/>
             </a:p>
           </p:txBody>
         </p:sp>
@@ -3820,8 +3673,8 @@
           </p:nvSpPr>
           <p:spPr>
             <a:xfrm>
-              <a:off x="8877303" y="2260485"/>
-              <a:ext cx="26631897" cy="2373593"/>
+              <a:off x="21139628" y="6187439"/>
+              <a:ext cx="9035930" cy="1384995"/>
             </a:xfrm>
             <a:prstGeom prst="rect">
               <a:avLst/>
@@ -3836,7 +3689,7 @@
             <a:p>
               <a:pPr algn="ctr"/>
               <a:r>
-                <a:rPr lang="en-US" sz="7200" dirty="0" smtClean="0"/>
+                <a:rPr lang="en-US" sz="8400" dirty="0"/>
                 <a:t>Design Overview</a:t>
               </a:r>
             </a:p>
@@ -3851,8 +3704,8 @@
         </p:nvGrpSpPr>
         <p:grpSpPr>
           <a:xfrm>
-            <a:off x="3581400" y="18205382"/>
-            <a:ext cx="7745084" cy="1606618"/>
+            <a:off x="4178300" y="21192623"/>
+            <a:ext cx="9035931" cy="1874388"/>
             <a:chOff x="8877300" y="8889859"/>
             <a:chExt cx="26631900" cy="3366589"/>
           </a:xfrm>
@@ -3925,7 +3778,7 @@
             <a:lstStyle/>
             <a:p>
               <a:pPr algn="ctr"/>
-              <a:endParaRPr lang="en-US"/>
+              <a:endParaRPr lang="en-US" sz="11706"/>
             </a:p>
           </p:txBody>
         </p:sp>
@@ -3938,7 +3791,7 @@
           <p:spPr>
             <a:xfrm>
               <a:off x="8877303" y="9432323"/>
-              <a:ext cx="26631897" cy="2373593"/>
+              <a:ext cx="26631897" cy="2487590"/>
             </a:xfrm>
             <a:prstGeom prst="rect">
               <a:avLst/>
@@ -3953,7 +3806,7 @@
             <a:p>
               <a:pPr algn="ctr"/>
               <a:r>
-                <a:rPr lang="en-US" sz="7200" dirty="0" smtClean="0"/>
+                <a:rPr lang="en-US" sz="8400" dirty="0"/>
                 <a:t>The Team</a:t>
               </a:r>
             </a:p>
@@ -3962,38 +3815,17 @@
       </p:grpSp>
       <p:grpSp>
         <p:nvGrpSpPr>
-          <p:cNvPr id="58" name="Group 57"/>
+          <p:cNvPr id="7" name="Group 6"/>
           <p:cNvGrpSpPr/>
           <p:nvPr/>
         </p:nvGrpSpPr>
         <p:grpSpPr>
           <a:xfrm>
-            <a:off x="30859558" y="5029199"/>
-            <a:ext cx="11007770" cy="2582645"/>
-            <a:chOff x="8877300" y="1718028"/>
-            <a:chExt cx="26631900" cy="5107057"/>
+            <a:off x="35717401" y="5867399"/>
+            <a:ext cx="12842398" cy="1986237"/>
+            <a:chOff x="36002818" y="5867400"/>
+            <a:chExt cx="12842398" cy="1986237"/>
           </a:xfrm>
-          <a:gradFill>
-            <a:gsLst>
-              <a:gs pos="50000">
-                <a:srgbClr val="FF0300">
-                  <a:lumMod val="40000"/>
-                  <a:lumOff val="60000"/>
-                </a:srgbClr>
-              </a:gs>
-              <a:gs pos="20000">
-                <a:srgbClr val="FF0000">
-                  <a:lumMod val="91000"/>
-                </a:srgbClr>
-              </a:gs>
-              <a:gs pos="82000">
-                <a:srgbClr val="FF0000">
-                  <a:lumMod val="91000"/>
-                </a:srgbClr>
-              </a:gs>
-            </a:gsLst>
-            <a:lin ang="10800000" scaled="0"/>
-          </a:gradFill>
         </p:grpSpPr>
         <p:sp>
           <p:nvSpPr>
@@ -4003,8 +3835,8 @@
           </p:nvSpPr>
           <p:spPr>
             <a:xfrm>
-              <a:off x="8877300" y="1718028"/>
-              <a:ext cx="26631900" cy="3366590"/>
+              <a:off x="36002818" y="5867400"/>
+              <a:ext cx="12842398" cy="1986237"/>
             </a:xfrm>
             <a:prstGeom prst="roundRect">
               <a:avLst/>
@@ -4042,7 +3874,7 @@
             <a:lstStyle/>
             <a:p>
               <a:pPr algn="ctr"/>
-              <a:endParaRPr lang="en-US"/>
+              <a:endParaRPr lang="en-US" sz="11706"/>
             </a:p>
           </p:txBody>
         </p:sp>
@@ -4054,8 +3886,8 @@
           </p:nvSpPr>
           <p:spPr>
             <a:xfrm>
-              <a:off x="8877302" y="2260485"/>
-              <a:ext cx="26631898" cy="4564600"/>
+              <a:off x="36002819" y="6187441"/>
+              <a:ext cx="12842397" cy="1384995"/>
             </a:xfrm>
             <a:prstGeom prst="rect">
               <a:avLst/>
@@ -4070,7 +3902,7 @@
             <a:p>
               <a:pPr algn="ctr"/>
               <a:r>
-                <a:rPr lang="en-US" sz="7200" dirty="0" smtClean="0"/>
+                <a:rPr lang="en-US" sz="8400" dirty="0"/>
                 <a:t>Conclusion &amp; Future Work</a:t>
               </a:r>
             </a:p>
@@ -4085,8 +3917,8 @@
         </p:nvGrpSpPr>
         <p:grpSpPr>
           <a:xfrm>
-            <a:off x="3733800" y="27786911"/>
-            <a:ext cx="7745084" cy="1550089"/>
+            <a:off x="4178300" y="32323633"/>
+            <a:ext cx="9035931" cy="1808437"/>
             <a:chOff x="8877300" y="8777695"/>
             <a:chExt cx="26631900" cy="3366590"/>
           </a:xfrm>
@@ -4159,7 +3991,7 @@
             <a:lstStyle/>
             <a:p>
               <a:pPr algn="ctr"/>
-              <a:endParaRPr lang="en-US"/>
+              <a:endParaRPr lang="en-US" sz="11706"/>
             </a:p>
           </p:txBody>
         </p:sp>
@@ -4171,8 +4003,8 @@
           </p:nvSpPr>
           <p:spPr>
             <a:xfrm>
-              <a:off x="8877303" y="9320152"/>
-              <a:ext cx="26631897" cy="2373592"/>
+              <a:off x="8877303" y="9320153"/>
+              <a:ext cx="26631897" cy="2578309"/>
             </a:xfrm>
             <a:prstGeom prst="rect">
               <a:avLst/>
@@ -4187,7 +4019,7 @@
             <a:p>
               <a:pPr algn="ctr"/>
               <a:r>
-                <a:rPr lang="en-US" sz="7200" dirty="0" smtClean="0"/>
+                <a:rPr lang="en-US" sz="8400" dirty="0"/>
                 <a:t>Acknowledgements</a:t>
               </a:r>
             </a:p>
@@ -4202,8 +4034,8 @@
         </p:nvSpPr>
         <p:spPr>
           <a:xfrm>
-            <a:off x="15009957" y="7065551"/>
-            <a:ext cx="13977876" cy="3416320"/>
+            <a:off x="17511617" y="8243144"/>
+            <a:ext cx="16307522" cy="3970318"/>
           </a:xfrm>
           <a:prstGeom prst="rect">
             <a:avLst/>
@@ -4211,72 +4043,43 @@
           <a:noFill/>
         </p:spPr>
         <p:txBody>
-          <a:bodyPr wrap="square" lIns="731520" rIns="731520" rtlCol="0">
+          <a:bodyPr wrap="square" lIns="853440" rIns="853440" rtlCol="0">
             <a:spAutoFit/>
           </a:bodyPr>
           <a:lstStyle/>
           <a:p>
             <a:r>
-              <a:rPr lang="en-US" sz="3600" dirty="0" smtClean="0"/>
-              <a:t>To </a:t>
-            </a:r>
-            <a:r>
-              <a:rPr lang="en-US" sz="3600" dirty="0" smtClean="0"/>
-              <a:t>address the needs of students, </a:t>
-            </a:r>
-            <a:r>
-              <a:rPr lang="en-US" sz="3600" dirty="0" smtClean="0"/>
-              <a:t>several doors in the </a:t>
-            </a:r>
-            <a:r>
-              <a:rPr lang="en-US" sz="3600" dirty="0" err="1" smtClean="0"/>
+              <a:rPr lang="en-US" sz="4200" dirty="0" smtClean="0"/>
+              <a:t>    To </a:t>
+            </a:r>
+            <a:r>
+              <a:rPr lang="en-US" sz="4200" dirty="0"/>
+              <a:t>address the needs of students, several doors in the </a:t>
+            </a:r>
+            <a:r>
+              <a:rPr lang="en-US" sz="4200" dirty="0" err="1"/>
               <a:t>Driftmier</a:t>
             </a:r>
             <a:r>
-              <a:rPr lang="en-US" sz="3600" dirty="0" smtClean="0"/>
-              <a:t> Engineering Center were closely studied. </a:t>
-            </a:r>
-            <a:r>
-              <a:rPr lang="en-US" sz="3600" dirty="0" smtClean="0"/>
-              <a:t>The locking mechanism on a majority of classrooms could remain locked but be opened by rotating the doorknob inside the room. Based on this type of locking mechanism, a system to rotate the inside doorknob using a motor controller, stepper motor, and rotary encoder was devised.</a:t>
+              <a:rPr lang="en-US" sz="4200" dirty="0"/>
+              <a:t> Engineering Center were closely studied. The locking mechanism on a majority of classrooms could remain locked but be opened by rotating the doorknob inside the room. Based on this type of locking mechanism, a system to rotate the inside doorknob using a motor controller, stepper motor, and rotary encoder was devised.</a:t>
             </a:r>
           </a:p>
         </p:txBody>
       </p:sp>
       <p:grpSp>
         <p:nvGrpSpPr>
-          <p:cNvPr id="45" name="Group 44"/>
+          <p:cNvPr id="8" name="Group 7"/>
           <p:cNvGrpSpPr/>
           <p:nvPr/>
         </p:nvGrpSpPr>
         <p:grpSpPr>
           <a:xfrm>
-            <a:off x="32246260" y="15240000"/>
-            <a:ext cx="7745084" cy="1702489"/>
-            <a:chOff x="8877300" y="1718028"/>
-            <a:chExt cx="26631900" cy="3366590"/>
+            <a:off x="37620634" y="23960872"/>
+            <a:ext cx="9035931" cy="1986237"/>
+            <a:chOff x="37906051" y="24287970"/>
+            <a:chExt cx="9035931" cy="1986237"/>
           </a:xfrm>
-          <a:gradFill>
-            <a:gsLst>
-              <a:gs pos="50000">
-                <a:srgbClr val="FF0300">
-                  <a:lumMod val="40000"/>
-                  <a:lumOff val="60000"/>
-                </a:srgbClr>
-              </a:gs>
-              <a:gs pos="20000">
-                <a:srgbClr val="FF0000">
-                  <a:lumMod val="91000"/>
-                </a:srgbClr>
-              </a:gs>
-              <a:gs pos="82000">
-                <a:srgbClr val="FF0000">
-                  <a:lumMod val="91000"/>
-                </a:srgbClr>
-              </a:gs>
-            </a:gsLst>
-            <a:lin ang="10800000" scaled="0"/>
-          </a:gradFill>
         </p:grpSpPr>
         <p:sp>
           <p:nvSpPr>
@@ -4286,8 +4089,8 @@
           </p:nvSpPr>
           <p:spPr>
             <a:xfrm>
-              <a:off x="8877300" y="1718028"/>
-              <a:ext cx="26631900" cy="3366590"/>
+              <a:off x="37906051" y="24287970"/>
+              <a:ext cx="9035931" cy="1986237"/>
             </a:xfrm>
             <a:prstGeom prst="roundRect">
               <a:avLst/>
@@ -4325,7 +4128,7 @@
             <a:lstStyle/>
             <a:p>
               <a:pPr algn="ctr"/>
-              <a:endParaRPr lang="en-US"/>
+              <a:endParaRPr lang="en-US" sz="11706"/>
             </a:p>
           </p:txBody>
         </p:sp>
@@ -4337,8 +4140,8 @@
           </p:nvSpPr>
           <p:spPr>
             <a:xfrm>
-              <a:off x="8877303" y="2260485"/>
-              <a:ext cx="26631897" cy="2373593"/>
+              <a:off x="37906052" y="24608011"/>
+              <a:ext cx="9035930" cy="1384995"/>
             </a:xfrm>
             <a:prstGeom prst="rect">
               <a:avLst/>
@@ -4353,7 +4156,7 @@
             <a:p>
               <a:pPr algn="ctr"/>
               <a:r>
-                <a:rPr lang="en-US" sz="7200" dirty="0" smtClean="0"/>
+                <a:rPr lang="en-US" sz="8400" dirty="0"/>
                 <a:t>Cost Analysis</a:t>
               </a:r>
             </a:p>
@@ -4363,7 +4166,7 @@
       <p:pic>
         <p:nvPicPr>
           <p:cNvPr id="14" name="Picture 6" descr="http://b.vimeocdn.com/ts/340/684/340684622_640.jpg">
-            <a:hlinkClick r:id="rId3"/>
+            <a:hlinkClick r:id="rId2"/>
           </p:cNvPr>
           <p:cNvPicPr>
             <a:picLocks noChangeAspect="1" noChangeArrowheads="1"/>
@@ -4371,7 +4174,7 @@
           <p:nvPr/>
         </p:nvPicPr>
         <p:blipFill>
-          <a:blip r:embed="rId4" cstate="print">
+          <a:blip r:embed="rId3" cstate="print">
             <a:extLst>
               <a:ext uri="{28A0092B-C50C-407E-A947-70E740481C1C}">
                 <a14:useLocalDpi xmlns:a14="http://schemas.microsoft.com/office/drawing/2010/main" val="0"/>
@@ -4385,8 +4188,8 @@
         </p:blipFill>
         <p:spPr bwMode="auto">
           <a:xfrm>
-            <a:off x="2731368" y="388203"/>
-            <a:ext cx="4754051" cy="3483829"/>
+            <a:off x="2286000" y="452903"/>
+            <a:ext cx="5546393" cy="4064467"/>
           </a:xfrm>
           <a:prstGeom prst="rect">
             <a:avLst/>
@@ -4412,7 +4215,7 @@
           <p:nvPr/>
         </p:nvPicPr>
         <p:blipFill>
-          <a:blip r:embed="rId5" cstate="print">
+          <a:blip r:embed="rId4" cstate="print">
             <a:extLst>
               <a:ext uri="{28A0092B-C50C-407E-A947-70E740481C1C}">
                 <a14:useLocalDpi xmlns:a14="http://schemas.microsoft.com/office/drawing/2010/main" val="0"/>
@@ -4426,8 +4229,8 @@
         </p:blipFill>
         <p:spPr bwMode="auto">
           <a:xfrm>
-            <a:off x="35756850" y="1816953"/>
-            <a:ext cx="7219950" cy="847725"/>
+            <a:off x="41986200" y="1990629"/>
+            <a:ext cx="8423275" cy="989013"/>
           </a:xfrm>
           <a:prstGeom prst="rect">
             <a:avLst/>
@@ -4452,8 +4255,8 @@
         </p:nvSpPr>
         <p:spPr>
           <a:xfrm>
-            <a:off x="1169154" y="29467076"/>
-            <a:ext cx="13030200" cy="2308324"/>
+            <a:off x="936374" y="34378255"/>
+            <a:ext cx="16002000" cy="2677656"/>
           </a:xfrm>
           <a:prstGeom prst="rect">
             <a:avLst/>
@@ -4461,135 +4264,56 @@
           <a:noFill/>
         </p:spPr>
         <p:txBody>
-          <a:bodyPr wrap="square" rtlCol="0">
+          <a:bodyPr wrap="square" lIns="850392" rIns="850392" rtlCol="0">
             <a:spAutoFit/>
           </a:bodyPr>
           <a:lstStyle/>
           <a:p>
             <a:r>
-              <a:rPr lang="en-US" sz="3600" dirty="0" smtClean="0"/>
+              <a:rPr lang="en-US" sz="4200" dirty="0"/>
               <a:t>Special thanks to:</a:t>
             </a:r>
           </a:p>
           <a:p>
-            <a:pPr marL="571500" indent="-571500">
+            <a:pPr marL="666769" indent="-666769">
               <a:buFont typeface="Arial" pitchFamily="34" charset="0"/>
               <a:buChar char="•"/>
             </a:pPr>
             <a:r>
-              <a:rPr lang="en-US" sz="3600" dirty="0" smtClean="0"/>
-              <a:t>Victor Lee (colleague) for printing our group’s poster.</a:t>
-            </a:r>
-          </a:p>
-          <a:p>
-            <a:pPr marL="571500" indent="-571500">
+              <a:rPr lang="en-US" sz="4200" dirty="0"/>
+              <a:t>Victor Lee (colleague) for printing our group’s poster</a:t>
+            </a:r>
+            <a:r>
+              <a:rPr lang="en-US" sz="4200" dirty="0" smtClean="0"/>
+              <a:t>. </a:t>
+            </a:r>
+          </a:p>
+          <a:p>
+            <a:pPr marL="666769" indent="-666769">
               <a:buFont typeface="Arial" pitchFamily="34" charset="0"/>
               <a:buChar char="•"/>
             </a:pPr>
             <a:r>
-              <a:rPr lang="en-US" sz="3600" dirty="0" smtClean="0"/>
-              <a:t>Thanks to Terry Walsh for assisting with project demonstration.</a:t>
-            </a:r>
-          </a:p>
-          <a:p>
-            <a:pPr marL="571500" indent="-571500">
-              <a:buFont typeface="Arial" pitchFamily="34" charset="0"/>
-              <a:buChar char="•"/>
-            </a:pPr>
-            <a:r>
-              <a:rPr lang="en-US" sz="3600" dirty="0" smtClean="0"/>
-              <a:t>Dr. Johnsen and Dr. Kner for their invaluable help and guidance.</a:t>
-            </a:r>
-            <a:endParaRPr lang="en-US" sz="3600" dirty="0"/>
-          </a:p>
-        </p:txBody>
-      </p:sp>
-      <p:graphicFrame>
-        <p:nvGraphicFramePr>
-          <p:cNvPr id="2" name="Object 1"/>
-          <p:cNvGraphicFramePr>
-            <a:graphicFrameLocks noChangeAspect="1"/>
-          </p:cNvGraphicFramePr>
-          <p:nvPr>
-            <p:extLst>
-              <p:ext uri="{D42A27DB-BD31-4B8C-83A1-F6EECF244321}">
-                <p14:modId xmlns:p14="http://schemas.microsoft.com/office/powerpoint/2010/main" val="3251884374"/>
-              </p:ext>
-            </p:extLst>
-          </p:nvPr>
-        </p:nvGraphicFramePr>
-        <p:xfrm>
-          <a:off x="30632400" y="17602200"/>
-          <a:ext cx="11300679" cy="13660947"/>
-        </p:xfrm>
-        <a:graphic>
-          <a:graphicData uri="http://schemas.openxmlformats.org/presentationml/2006/ole">
-            <mc:AlternateContent xmlns:mc="http://schemas.openxmlformats.org/markup-compatibility/2006">
-              <mc:Choice xmlns:v="urn:schemas-microsoft-com:vml" Requires="v">
-                <p:oleObj spid="_x0000_s1099" name="Binary Worksheet" r:id="rId6" imgW="9029633" imgH="10915656" progId="Excel.SheetBinaryMacroEnabled.12">
-                  <p:embed/>
-                </p:oleObj>
-              </mc:Choice>
-              <mc:Fallback>
-                <p:oleObj name="Binary Worksheet" r:id="rId6" imgW="9029633" imgH="10915656" progId="Excel.SheetBinaryMacroEnabled.12">
-                  <p:embed/>
-                  <p:pic>
-                    <p:nvPicPr>
-                      <p:cNvPr id="0" name="Picture 45"/>
-                      <p:cNvPicPr>
-                        <a:picLocks noChangeAspect="1" noChangeArrowheads="1"/>
-                      </p:cNvPicPr>
-                      <p:nvPr/>
-                    </p:nvPicPr>
-                    <p:blipFill>
-                      <a:blip r:embed="rId7">
-                        <a:extLst>
-                          <a:ext uri="{28A0092B-C50C-407E-A947-70E740481C1C}">
-                            <a14:useLocalDpi xmlns:a14="http://schemas.microsoft.com/office/drawing/2010/main" val="0"/>
-                          </a:ext>
-                        </a:extLst>
-                      </a:blip>
-                      <a:srcRect/>
-                      <a:stretch>
-                        <a:fillRect/>
-                      </a:stretch>
-                    </p:blipFill>
-                    <p:spPr bwMode="auto">
-                      <a:xfrm>
-                        <a:off x="30632400" y="17602200"/>
-                        <a:ext cx="11300679" cy="13660947"/>
-                      </a:xfrm>
-                      <a:prstGeom prst="rect">
-                        <a:avLst/>
-                      </a:prstGeom>
-                      <a:noFill/>
-                      <a:extLst>
-                        <a:ext uri="{909E8E84-426E-40DD-AFC4-6F175D3DCCD1}">
-                          <a14:hiddenFill xmlns:a14="http://schemas.microsoft.com/office/drawing/2010/main">
-                            <a:solidFill>
-                              <a:srgbClr val="FFFFFF"/>
-                            </a:solidFill>
-                          </a14:hiddenFill>
-                        </a:ext>
-                      </a:extLst>
-                    </p:spPr>
-                  </p:pic>
-                </p:oleObj>
-              </mc:Fallback>
-            </mc:AlternateContent>
-          </a:graphicData>
-        </a:graphic>
-      </p:graphicFrame>
-      <p:sp>
-        <p:nvSpPr>
-          <p:cNvPr id="3" name="TextBox 2"/>
+              <a:rPr lang="en-US" sz="4200" dirty="0" smtClean="0"/>
+              <a:t>Dr</a:t>
+            </a:r>
+            <a:r>
+              <a:rPr lang="en-US" sz="4200" dirty="0"/>
+              <a:t>. Johnsen and Dr. Kner for their invaluable help and guidance.</a:t>
+            </a:r>
+          </a:p>
+        </p:txBody>
+      </p:sp>
+      <p:sp>
+        <p:nvSpPr>
+          <p:cNvPr id="50" name="TextBox 49"/>
           <p:cNvSpPr txBox="1"/>
           <p:nvPr/>
         </p:nvSpPr>
         <p:spPr>
           <a:xfrm>
-            <a:off x="30403800" y="7162800"/>
-            <a:ext cx="11277600" cy="7848304"/>
+            <a:off x="936373" y="31410663"/>
+            <a:ext cx="16002001" cy="666786"/>
           </a:xfrm>
           <a:prstGeom prst="rect">
             <a:avLst/>
@@ -4602,34 +4326,29 @@
           </a:bodyPr>
           <a:lstStyle/>
           <a:p>
-            <a:r>
-              <a:rPr lang="en-US" sz="3600" dirty="0" smtClean="0"/>
-              <a:t>     After research and testing, a working prototype of the station, dock, bridge, and database was successfully built. Each component of the system was able to communicate with each other in order to lock or unlock a bike, as long as there was a valid bike and valid user RFID. The project is completely scalable  because more docks could be added to our station and more stations could be added to the network. </a:t>
-            </a:r>
-          </a:p>
-          <a:p>
-            <a:r>
-              <a:rPr lang="en-US" sz="3600" dirty="0"/>
-              <a:t> </a:t>
-            </a:r>
-            <a:r>
-              <a:rPr lang="en-US" sz="3600" dirty="0" smtClean="0"/>
-              <a:t>   Future work would consist of better hardware and software security, corrections and improvements to the PCB design, and the hardware being used. The current security does not take into account the power being turned off, if the lid to access the PCB board  is open or not, or if the online forms and websites are hacked. </a:t>
-            </a:r>
-            <a:endParaRPr lang="en-US" sz="3600" dirty="0"/>
-          </a:p>
-        </p:txBody>
-      </p:sp>
-      <p:sp>
-        <p:nvSpPr>
-          <p:cNvPr id="50" name="TextBox 49"/>
+            <a:pPr algn="ctr"/>
+            <a:r>
+              <a:rPr lang="en-US" sz="3733" dirty="0"/>
+              <a:t>From left to right: Adam Hall, Jasper Yu, Peter </a:t>
+            </a:r>
+            <a:r>
+              <a:rPr lang="en-US" sz="3733" dirty="0" smtClean="0"/>
+              <a:t>Wins</a:t>
+            </a:r>
+            <a:endParaRPr lang="en-US" sz="3733" dirty="0"/>
+          </a:p>
+        </p:txBody>
+      </p:sp>
+      <p:sp>
+        <p:nvSpPr>
+          <p:cNvPr id="66" name="TextBox 65"/>
           <p:cNvSpPr txBox="1"/>
           <p:nvPr/>
         </p:nvSpPr>
         <p:spPr>
           <a:xfrm>
-            <a:off x="1524000" y="26923425"/>
-            <a:ext cx="12192000" cy="584775"/>
+            <a:off x="6359671" y="26885305"/>
+            <a:ext cx="4673190" cy="738664"/>
           </a:xfrm>
           <a:prstGeom prst="rect">
             <a:avLst/>
@@ -4642,25 +4361,24 @@
           </a:bodyPr>
           <a:lstStyle/>
           <a:p>
-            <a:pPr algn="ctr"/>
-            <a:r>
-              <a:rPr lang="en-US" sz="3200" dirty="0" smtClean="0"/>
-              <a:t>From left to right: Adam Hall, Jasper Yu, Peter Wins, Dr. Johnsen</a:t>
-            </a:r>
-            <a:endParaRPr lang="en-US" sz="3200" dirty="0"/>
-          </a:p>
-        </p:txBody>
-      </p:sp>
-      <p:sp>
-        <p:nvSpPr>
-          <p:cNvPr id="66" name="TextBox 65"/>
+            <a:r>
+              <a:rPr lang="en-US" sz="4200" b="1" dirty="0"/>
+              <a:t>Team Picture Here!</a:t>
+            </a:r>
+            <a:endParaRPr lang="en-US" sz="4200" dirty="0"/>
+          </a:p>
+        </p:txBody>
+      </p:sp>
+      <p:sp>
+        <p:nvSpPr>
+          <p:cNvPr id="44" name="TextBox 43"/>
           <p:cNvSpPr txBox="1"/>
           <p:nvPr/>
         </p:nvSpPr>
         <p:spPr>
           <a:xfrm>
-            <a:off x="5451146" y="23044547"/>
-            <a:ext cx="4005591" cy="646331"/>
+            <a:off x="22962359" y="14224000"/>
+            <a:ext cx="5192783" cy="738664"/>
           </a:xfrm>
           <a:prstGeom prst="rect">
             <a:avLst/>
@@ -4674,23 +4392,23 @@
           <a:lstStyle/>
           <a:p>
             <a:r>
-              <a:rPr lang="en-US" sz="3600" b="1" dirty="0" smtClean="0"/>
-              <a:t>Team Picture Here!</a:t>
-            </a:r>
-            <a:endParaRPr lang="en-US" sz="3600" dirty="0"/>
-          </a:p>
-        </p:txBody>
-      </p:sp>
-      <p:sp>
-        <p:nvSpPr>
-          <p:cNvPr id="44" name="TextBox 43"/>
+              <a:rPr lang="en-US" sz="4200" b="1" dirty="0"/>
+              <a:t>Some Pictures Here!</a:t>
+            </a:r>
+            <a:endParaRPr lang="en-US" sz="4200" dirty="0"/>
+          </a:p>
+        </p:txBody>
+      </p:sp>
+      <p:sp>
+        <p:nvSpPr>
+          <p:cNvPr id="68" name="TextBox 67"/>
           <p:cNvSpPr txBox="1"/>
           <p:nvPr/>
         </p:nvSpPr>
         <p:spPr>
           <a:xfrm>
-            <a:off x="19682021" y="12192000"/>
-            <a:ext cx="4450957" cy="646331"/>
+            <a:off x="22962359" y="34361448"/>
+            <a:ext cx="5192783" cy="738664"/>
           </a:xfrm>
           <a:prstGeom prst="rect">
             <a:avLst/>
@@ -4704,27 +4422,23 @@
           <a:lstStyle/>
           <a:p>
             <a:r>
-              <a:rPr lang="en-US" sz="3600" b="1" dirty="0" smtClean="0"/>
-              <a:t>Some Pictures </a:t>
-            </a:r>
-            <a:r>
-              <a:rPr lang="en-US" sz="3600" b="1" dirty="0" smtClean="0"/>
-              <a:t>Here!</a:t>
-            </a:r>
-            <a:endParaRPr lang="en-US" sz="3600" dirty="0"/>
-          </a:p>
-        </p:txBody>
-      </p:sp>
-      <p:sp>
-        <p:nvSpPr>
-          <p:cNvPr id="68" name="TextBox 67"/>
+              <a:rPr lang="en-US" sz="4200" b="1" dirty="0"/>
+              <a:t>Some Pictures Here!</a:t>
+            </a:r>
+            <a:endParaRPr lang="en-US" sz="4200" dirty="0"/>
+          </a:p>
+        </p:txBody>
+      </p:sp>
+      <p:sp>
+        <p:nvSpPr>
+          <p:cNvPr id="70" name="TextBox 69"/>
           <p:cNvSpPr txBox="1"/>
           <p:nvPr/>
         </p:nvSpPr>
         <p:spPr>
           <a:xfrm>
-            <a:off x="19682021" y="29452669"/>
-            <a:ext cx="4450957" cy="646331"/>
+            <a:off x="22962359" y="24358600"/>
+            <a:ext cx="5192783" cy="738664"/>
           </a:xfrm>
           <a:prstGeom prst="rect">
             <a:avLst/>
@@ -4738,27 +4452,23 @@
           <a:lstStyle/>
           <a:p>
             <a:r>
-              <a:rPr lang="en-US" sz="3600" b="1" dirty="0" smtClean="0"/>
-              <a:t>Some Pictures </a:t>
-            </a:r>
-            <a:r>
-              <a:rPr lang="en-US" sz="3600" b="1" dirty="0" smtClean="0"/>
-              <a:t>Here!</a:t>
-            </a:r>
-            <a:endParaRPr lang="en-US" sz="3600" dirty="0"/>
-          </a:p>
-        </p:txBody>
-      </p:sp>
-      <p:sp>
-        <p:nvSpPr>
-          <p:cNvPr id="70" name="TextBox 69"/>
+              <a:rPr lang="en-US" sz="4200" b="1" dirty="0"/>
+              <a:t>Some Pictures Here!</a:t>
+            </a:r>
+            <a:endParaRPr lang="en-US" sz="4200" dirty="0"/>
+          </a:p>
+        </p:txBody>
+      </p:sp>
+      <p:sp>
+        <p:nvSpPr>
+          <p:cNvPr id="41" name="TextBox 40"/>
           <p:cNvSpPr txBox="1"/>
           <p:nvPr/>
         </p:nvSpPr>
         <p:spPr>
           <a:xfrm>
-            <a:off x="19682021" y="20878800"/>
-            <a:ext cx="4450957" cy="646331"/>
+            <a:off x="17496046" y="17157701"/>
+            <a:ext cx="16323092" cy="5262979"/>
           </a:xfrm>
           <a:prstGeom prst="rect">
             <a:avLst/>
@@ -4766,33 +4476,45 @@
           <a:noFill/>
         </p:spPr>
         <p:txBody>
-          <a:bodyPr wrap="square" rtlCol="0">
+          <a:bodyPr wrap="square" lIns="853440" rIns="853440" rtlCol="0">
             <a:spAutoFit/>
           </a:bodyPr>
           <a:lstStyle/>
           <a:p>
             <a:r>
-              <a:rPr lang="en-US" sz="3600" b="1" dirty="0" smtClean="0"/>
-              <a:t>Some Pictures </a:t>
-            </a:r>
-            <a:r>
-              <a:rPr lang="en-US" sz="3600" b="1" dirty="0" smtClean="0"/>
-              <a:t>Here!</a:t>
-            </a:r>
-            <a:endParaRPr lang="en-US" sz="3600" dirty="0"/>
-          </a:p>
-        </p:txBody>
-      </p:sp>
-      <p:sp>
-        <p:nvSpPr>
-          <p:cNvPr id="41" name="TextBox 40"/>
+              <a:rPr lang="en-US" sz="4200" dirty="0" smtClean="0"/>
+              <a:t>    To </a:t>
+            </a:r>
+            <a:r>
+              <a:rPr lang="en-US" sz="4200" dirty="0"/>
+              <a:t>address the needs of faculty, the project needed to incorporate security features which would allow for basic access control and accountability through key card logging. Every few minutes, the device checks a whitelist database on a remote server for approved access keys, updates its local database of whitelisted keys, and sends local access logs to the remote server for later review. A web interface on the remote server allows for manual addition/removal of whitelisted </a:t>
+            </a:r>
+            <a:r>
+              <a:rPr lang="en-US" sz="4200" dirty="0" smtClean="0"/>
+              <a:t>keys </a:t>
+            </a:r>
+            <a:r>
+              <a:rPr lang="en-US" sz="4200" dirty="0"/>
+              <a:t>and for time-stamped </a:t>
+            </a:r>
+            <a:r>
+              <a:rPr lang="en-US" sz="4200" dirty="0" smtClean="0"/>
+              <a:t>logging.</a:t>
+            </a:r>
+            <a:endParaRPr lang="en-US" sz="4200" dirty="0"/>
+          </a:p>
+        </p:txBody>
+      </p:sp>
+      <p:sp>
+        <p:nvSpPr>
+          <p:cNvPr id="42" name="TextBox 41"/>
           <p:cNvSpPr txBox="1"/>
           <p:nvPr/>
         </p:nvSpPr>
         <p:spPr>
           <a:xfrm>
-            <a:off x="14996611" y="14706600"/>
-            <a:ext cx="13991222" cy="4524315"/>
+            <a:off x="17511616" y="27203400"/>
+            <a:ext cx="16307523" cy="5262979"/>
           </a:xfrm>
           <a:prstGeom prst="rect">
             <a:avLst/>
@@ -4800,40 +4522,32 @@
           <a:noFill/>
         </p:spPr>
         <p:txBody>
-          <a:bodyPr wrap="square" lIns="731520" rIns="731520" rtlCol="0">
+          <a:bodyPr wrap="square" lIns="853440" rIns="853440" rtlCol="0">
             <a:spAutoFit/>
           </a:bodyPr>
           <a:lstStyle/>
           <a:p>
             <a:r>
-              <a:rPr lang="en-US" sz="3600" dirty="0" smtClean="0"/>
-              <a:t>To </a:t>
-            </a:r>
-            <a:r>
-              <a:rPr lang="en-US" sz="3600" dirty="0" smtClean="0"/>
-              <a:t>address the needs of </a:t>
-            </a:r>
-            <a:r>
-              <a:rPr lang="en-US" sz="3600" dirty="0" smtClean="0"/>
-              <a:t>faculty, the project needed to incorporate security features which would allow for basic access control and accountability through key card logging. </a:t>
-            </a:r>
-            <a:r>
-              <a:rPr lang="en-US" sz="3600" dirty="0" smtClean="0"/>
-              <a:t>Every few minutes, the device checks a whitelist database on a remote server for approved access keys, updates its local database of whitelisted keys, and sends local access logs to the remote server for later review. A web interface on the remote server allows for manual addition/removal of whitelisted keys, and for time-stamped log viewing.</a:t>
-            </a:r>
-          </a:p>
-        </p:txBody>
-      </p:sp>
-      <p:sp>
-        <p:nvSpPr>
-          <p:cNvPr id="42" name="TextBox 41"/>
+              <a:rPr lang="en-US" sz="4200" dirty="0" smtClean="0"/>
+              <a:t>    To </a:t>
+            </a:r>
+            <a:r>
+              <a:rPr lang="en-US" sz="4200" dirty="0"/>
+              <a:t>address the needs of the University System, an RFID access system was implemented. This approach solves one of the greatest problems of the traditional door key access system: students losing keys. When a student loses a key, the University has a decision to make: keep the compromised lock and replace the key, or replace both the lock and the key. Neither choice is ideal. By implementing a system with easily-replaceable keys, both of these traditional problems are solved.</a:t>
+            </a:r>
+          </a:p>
+        </p:txBody>
+      </p:sp>
+      <p:sp>
+        <p:nvSpPr>
+          <p:cNvPr id="64" name="TextBox 63"/>
           <p:cNvSpPr txBox="1"/>
           <p:nvPr/>
         </p:nvSpPr>
         <p:spPr>
           <a:xfrm>
-            <a:off x="15009956" y="23317200"/>
-            <a:ext cx="13977877" cy="4524315"/>
+            <a:off x="34137601" y="8356600"/>
+            <a:ext cx="16001999" cy="15604272"/>
           </a:xfrm>
           <a:prstGeom prst="rect">
             <a:avLst/>
@@ -4841,16 +4555,22 @@
           <a:noFill/>
         </p:spPr>
         <p:txBody>
-          <a:bodyPr wrap="square" lIns="731520" rIns="731520" rtlCol="0">
+          <a:bodyPr wrap="square" lIns="850392" rIns="850392" rtlCol="0">
             <a:spAutoFit/>
           </a:bodyPr>
           <a:lstStyle/>
           <a:p>
             <a:r>
-              <a:rPr lang="en-US" sz="3600" dirty="0"/>
-              <a:t>To address the needs of the University System, an RFID access system was implemented. This approach solves one of the greatest problems of the traditional door key access system: students losing keys. When a student loses a key, the University has a decision to make: keep the compromised lock and replace the key, or replace both the lock and the key. Neither choice is ideal. By implementing a system with easily-replaceable keys, both of these traditional problems are solved.</a:t>
-            </a:r>
-            <a:endParaRPr lang="en-US" sz="3600" dirty="0"/>
+              <a:rPr lang="en-US" sz="4200" dirty="0"/>
+              <a:t> After research and testing, a working prototype which scanned RFID cards, compared their key values to a database of whitelisted keys, and rotated a doorknob to allow entry to an approved user was successfully built. The prototype was presented as a proof-of-concept piece, demonstrating potential functionality and the inexpensive, off-the-shelf nature of its constituent components. The project is capable of scaling to accommodate many students across many different classrooms, as scaling only involves trivial database configuration on a controlling server. </a:t>
+            </a:r>
+          </a:p>
+          <a:p>
+            <a:r>
+              <a:rPr lang="en-US" sz="4200" dirty="0"/>
+              <a:t>     Future work would address each of the project’s components: better hardware to ensure reliable doorknob rotation, better security to ensure both faculty and the University system can place their trust in the device and in the system as a whole, and housing consideration and development. The current project does not properly address the very real possibility of physical tampering, nor does it address the potential security problems associated with hosting a whitelist database on a remote server. Also, as this project was only intended to demonstrate functionality, future work would involve consultation with a mechanical engineer to deliver a viable housing solution. At present, the project consists of several off-the-shelf components interfaced to deliver required functionality, but this is at the expense of potential space and weight savings. </a:t>
+            </a:r>
+            <a:endParaRPr lang="en-US" sz="4200" dirty="0"/>
           </a:p>
         </p:txBody>
       </p:sp>
@@ -4864,6 +4584,13 @@
   <p:clrMapOvr>
     <a:masterClrMapping/>
   </p:clrMapOvr>
+  <p:timing>
+    <p:tnLst>
+      <p:par>
+        <p:cTn id="1" dur="indefinite" restart="never" nodeType="tmRoot"/>
+      </p:par>
+    </p:tnLst>
+  </p:timing>
 </p:sld>
 </file>
 

</xml_diff>